<commit_message>
Continuação do desenvolvimento da Apresentação Oral
</commit_message>
<xml_diff>
--- a/doc/Apresentação Oral/Examination Timetabling Automation using Hybrid Meta-heuristics.pptx
+++ b/doc/Apresentação Oral/Examination Timetabling Automation using Hybrid Meta-heuristics.pptx
@@ -10,6 +10,13 @@
     <p:sldId id="258" r:id="rId4"/>
     <p:sldId id="259" r:id="rId5"/>
     <p:sldId id="260" r:id="rId6"/>
+    <p:sldId id="261" r:id="rId7"/>
+    <p:sldId id="262" r:id="rId8"/>
+    <p:sldId id="263" r:id="rId9"/>
+    <p:sldId id="264" r:id="rId10"/>
+    <p:sldId id="265" r:id="rId11"/>
+    <p:sldId id="266" r:id="rId12"/>
+    <p:sldId id="267" r:id="rId13"/>
   </p:sldIdLst>
   <p:sldSz cx="12192000" cy="6858000"/>
   <p:notesSz cx="6858000" cy="9144000"/>
@@ -108,6 +115,11 @@
       </a:defRPr>
     </a:lvl9pPr>
   </p:defaultTextStyle>
+  <p:extLst>
+    <p:ext uri="{EFAFB233-063F-42B5-8137-9DF3F51BA10A}">
+      <p15:sldGuideLst xmlns:p15="http://schemas.microsoft.com/office/powerpoint/2012/main"/>
+    </p:ext>
+  </p:extLst>
 </p:presentation>
 </file>
 
@@ -337,7 +349,7 @@
           <a:p>
             <a:fld id="{96DFF08F-DC6B-4601-B491-B0F83F6DD2DA}" type="datetimeFigureOut">
               <a:rPr lang="en-US" dirty="0"/>
-              <a:t>10-Jul-15</a:t>
+              <a:t>12-Jul-15</a:t>
             </a:fld>
             <a:endParaRPr lang="en-US" dirty="0"/>
           </a:p>
@@ -540,7 +552,7 @@
           <a:p>
             <a:fld id="{96DFF08F-DC6B-4601-B491-B0F83F6DD2DA}" type="datetimeFigureOut">
               <a:rPr lang="en-US" dirty="0"/>
-              <a:t>10-Jul-15</a:t>
+              <a:t>12-Jul-15</a:t>
             </a:fld>
             <a:endParaRPr lang="en-US" dirty="0"/>
           </a:p>
@@ -791,7 +803,7 @@
           <a:p>
             <a:fld id="{96DFF08F-DC6B-4601-B491-B0F83F6DD2DA}" type="datetimeFigureOut">
               <a:rPr lang="en-US" dirty="0"/>
-              <a:t>10-Jul-15</a:t>
+              <a:t>12-Jul-15</a:t>
             </a:fld>
             <a:endParaRPr lang="en-US" dirty="0"/>
           </a:p>
@@ -956,7 +968,7 @@
           <a:p>
             <a:fld id="{D62CEF3B-A037-46D0-B02C-1428F07E9383}" type="datetimeFigureOut">
               <a:rPr lang="en-US" dirty="0"/>
-              <a:t>10-Jul-15</a:t>
+              <a:t>12-Jul-15</a:t>
             </a:fld>
             <a:endParaRPr lang="en-US" dirty="0"/>
           </a:p>
@@ -1294,7 +1306,7 @@
           <a:p>
             <a:fld id="{96DFF08F-DC6B-4601-B491-B0F83F6DD2DA}" type="datetimeFigureOut">
               <a:rPr lang="en-US" dirty="0"/>
-              <a:t>10-Jul-15</a:t>
+              <a:t>12-Jul-15</a:t>
             </a:fld>
             <a:endParaRPr lang="en-US" dirty="0"/>
           </a:p>
@@ -1564,7 +1576,7 @@
           <a:p>
             <a:fld id="{96DFF08F-DC6B-4601-B491-B0F83F6DD2DA}" type="datetimeFigureOut">
               <a:rPr lang="en-US" dirty="0"/>
-              <a:t>10-Jul-15</a:t>
+              <a:t>12-Jul-15</a:t>
             </a:fld>
             <a:endParaRPr lang="en-US" dirty="0"/>
           </a:p>
@@ -1938,7 +1950,7 @@
           <a:p>
             <a:fld id="{96DFF08F-DC6B-4601-B491-B0F83F6DD2DA}" type="datetimeFigureOut">
               <a:rPr lang="en-US" dirty="0"/>
-              <a:t>10-Jul-15</a:t>
+              <a:t>12-Jul-15</a:t>
             </a:fld>
             <a:endParaRPr lang="en-US" dirty="0"/>
           </a:p>
@@ -2051,7 +2063,7 @@
           <a:p>
             <a:fld id="{96DFF08F-DC6B-4601-B491-B0F83F6DD2DA}" type="datetimeFigureOut">
               <a:rPr lang="en-US" dirty="0"/>
-              <a:t>10-Jul-15</a:t>
+              <a:t>12-Jul-15</a:t>
             </a:fld>
             <a:endParaRPr lang="en-US" dirty="0"/>
           </a:p>
@@ -2218,7 +2230,7 @@
             <a:fld id="{96DFF08F-DC6B-4601-B491-B0F83F6DD2DA}" type="datetimeFigureOut">
               <a:rPr lang="en-US" dirty="0"/>
               <a:pPr/>
-              <a:t>10-Jul-15</a:t>
+              <a:t>12-Jul-15</a:t>
             </a:fld>
             <a:endParaRPr lang="en-US" dirty="0"/>
           </a:p>
@@ -2569,7 +2581,7 @@
             <a:fld id="{96DFF08F-DC6B-4601-B491-B0F83F6DD2DA}" type="datetimeFigureOut">
               <a:rPr lang="en-US" dirty="0"/>
               <a:pPr/>
-              <a:t>10-Jul-15</a:t>
+              <a:t>12-Jul-15</a:t>
             </a:fld>
             <a:endParaRPr lang="en-US" dirty="0"/>
           </a:p>
@@ -2942,7 +2954,7 @@
           <a:p>
             <a:fld id="{96DFF08F-DC6B-4601-B491-B0F83F6DD2DA}" type="datetimeFigureOut">
               <a:rPr lang="en-US" dirty="0"/>
-              <a:t>10-Jul-15</a:t>
+              <a:t>12-Jul-15</a:t>
             </a:fld>
             <a:endParaRPr lang="en-US" dirty="0"/>
           </a:p>
@@ -3225,7 +3237,7 @@
             <a:fld id="{96DFF08F-DC6B-4601-B491-B0F83F6DD2DA}" type="datetimeFigureOut">
               <a:rPr lang="en-US" dirty="0"/>
               <a:pPr/>
-              <a:t>10-Jul-15</a:t>
+              <a:t>12-Jul-15</a:t>
             </a:fld>
             <a:endParaRPr lang="en-US" dirty="0"/>
           </a:p>
@@ -3828,9 +3840,34 @@
           <a:lstStyle/>
           <a:p>
             <a:r>
+              <a:rPr lang="pt-PT" dirty="0" err="1" smtClean="0"/>
+              <a:t>Made</a:t>
+            </a:r>
+            <a:r>
               <a:rPr lang="pt-PT" dirty="0" smtClean="0"/>
-              <a:t>Feito por:						Orientadores:</a:t>
-            </a:r>
+              <a:t> </a:t>
+            </a:r>
+            <a:r>
+              <a:rPr lang="pt-PT" dirty="0" err="1" smtClean="0"/>
+              <a:t>by</a:t>
+            </a:r>
+            <a:r>
+              <a:rPr lang="pt-PT" dirty="0" smtClean="0"/>
+              <a:t>:</a:t>
+            </a:r>
+            <a:r>
+              <a:rPr lang="pt-PT" dirty="0" smtClean="0"/>
+              <a:t>						</a:t>
+            </a:r>
+            <a:r>
+              <a:rPr lang="pt-PT" dirty="0" err="1" smtClean="0"/>
+              <a:t>Supervisors</a:t>
+            </a:r>
+            <a:r>
+              <a:rPr lang="pt-PT" dirty="0" smtClean="0"/>
+              <a:t>:</a:t>
+            </a:r>
+            <a:endParaRPr lang="pt-PT" dirty="0" smtClean="0"/>
           </a:p>
           <a:p>
             <a:r>
@@ -3891,6 +3928,470 @@
 </p:sld>
 </file>
 
+<file path=ppt/slides/slide10.xml><?xml version="1.0" encoding="utf-8"?>
+<p:sld xmlns:a="http://schemas.openxmlformats.org/drawingml/2006/main" xmlns:r="http://schemas.openxmlformats.org/officeDocument/2006/relationships" xmlns:p="http://schemas.openxmlformats.org/presentationml/2006/main">
+  <p:cSld>
+    <p:spTree>
+      <p:nvGrpSpPr>
+        <p:cNvPr id="1" name=""/>
+        <p:cNvGrpSpPr/>
+        <p:nvPr/>
+      </p:nvGrpSpPr>
+      <p:grpSpPr>
+        <a:xfrm>
+          <a:off x="0" y="0"/>
+          <a:ext cx="0" cy="0"/>
+          <a:chOff x="0" y="0"/>
+          <a:chExt cx="0" cy="0"/>
+        </a:xfrm>
+      </p:grpSpPr>
+      <p:sp>
+        <p:nvSpPr>
+          <p:cNvPr id="2" name="Title 1"/>
+          <p:cNvSpPr>
+            <a:spLocks noGrp="1"/>
+          </p:cNvSpPr>
+          <p:nvPr>
+            <p:ph type="title"/>
+          </p:nvPr>
+        </p:nvSpPr>
+        <p:spPr/>
+        <p:txBody>
+          <a:bodyPr/>
+          <a:lstStyle/>
+          <a:p>
+            <a:r>
+              <a:rPr lang="en-US" dirty="0" smtClean="0"/>
+              <a:t>ITC 2007 Examination timetabling problem</a:t>
+            </a:r>
+            <a:endParaRPr lang="en-US" dirty="0"/>
+          </a:p>
+        </p:txBody>
+      </p:sp>
+      <p:sp>
+        <p:nvSpPr>
+          <p:cNvPr id="3" name="Content Placeholder 2"/>
+          <p:cNvSpPr>
+            <a:spLocks noGrp="1"/>
+          </p:cNvSpPr>
+          <p:nvPr>
+            <p:ph idx="1"/>
+          </p:nvPr>
+        </p:nvSpPr>
+        <p:spPr/>
+        <p:txBody>
+          <a:bodyPr/>
+          <a:lstStyle/>
+          <a:p>
+            <a:pPr>
+              <a:buFont typeface="Arial" panose="020B0604020202020204" pitchFamily="34" charset="0"/>
+              <a:buChar char="•"/>
+            </a:pPr>
+            <a:r>
+              <a:rPr lang="en-US" dirty="0" smtClean="0"/>
+              <a:t> 12 different datasets;</a:t>
+            </a:r>
+          </a:p>
+          <a:p>
+            <a:pPr>
+              <a:buFont typeface="Arial" panose="020B0604020202020204" pitchFamily="34" charset="0"/>
+              <a:buChar char="•"/>
+            </a:pPr>
+            <a:r>
+              <a:rPr lang="en-US" dirty="0"/>
+              <a:t> </a:t>
+            </a:r>
+            <a:r>
+              <a:rPr lang="en-US" dirty="0" smtClean="0"/>
+              <a:t>Raking depends on the </a:t>
+            </a:r>
+            <a:r>
+              <a:rPr lang="en-US" i="1" dirty="0" smtClean="0"/>
+              <a:t>distance to feasibility</a:t>
+            </a:r>
+            <a:r>
+              <a:rPr lang="en-US" dirty="0" smtClean="0"/>
+              <a:t> and </a:t>
+            </a:r>
+            <a:r>
+              <a:rPr lang="en-US" i="1" dirty="0" smtClean="0"/>
+              <a:t>fitness </a:t>
+            </a:r>
+            <a:r>
+              <a:rPr lang="en-US" dirty="0" smtClean="0"/>
+              <a:t>values;</a:t>
+            </a:r>
+          </a:p>
+          <a:p>
+            <a:pPr>
+              <a:buFont typeface="Arial" panose="020B0604020202020204" pitchFamily="34" charset="0"/>
+              <a:buChar char="•"/>
+            </a:pPr>
+            <a:r>
+              <a:rPr lang="en-US" dirty="0" smtClean="0"/>
+              <a:t> The hard constraints are the following:</a:t>
+            </a:r>
+          </a:p>
+          <a:p>
+            <a:pPr lvl="1">
+              <a:buFont typeface="Arial" panose="020B0604020202020204" pitchFamily="34" charset="0"/>
+              <a:buChar char="•"/>
+            </a:pPr>
+            <a:r>
+              <a:rPr lang="en-US" dirty="0" smtClean="0"/>
+              <a:t>No student must be elected to be in more than 1 exam at the same time;</a:t>
+            </a:r>
+          </a:p>
+          <a:p>
+            <a:pPr lvl="1">
+              <a:buFont typeface="Arial" panose="020B0604020202020204" pitchFamily="34" charset="0"/>
+              <a:buChar char="•"/>
+            </a:pPr>
+            <a:r>
+              <a:rPr lang="en-US" dirty="0" smtClean="0"/>
+              <a:t>The number of students attending an exam must not exceed the room’s capacity;</a:t>
+            </a:r>
+          </a:p>
+          <a:p>
+            <a:pPr lvl="1">
+              <a:buFont typeface="Arial" panose="020B0604020202020204" pitchFamily="34" charset="0"/>
+              <a:buChar char="•"/>
+            </a:pPr>
+            <a:r>
+              <a:rPr lang="en-US" dirty="0" smtClean="0"/>
+              <a:t>Exam’s </a:t>
+            </a:r>
+            <a:r>
+              <a:rPr lang="en-US" dirty="0"/>
+              <a:t>length must not surpass the length of the assigned time </a:t>
+            </a:r>
+            <a:r>
+              <a:rPr lang="en-US" dirty="0" smtClean="0"/>
+              <a:t>slot;</a:t>
+            </a:r>
+          </a:p>
+          <a:p>
+            <a:pPr lvl="1">
+              <a:buFont typeface="Arial" panose="020B0604020202020204" pitchFamily="34" charset="0"/>
+              <a:buChar char="•"/>
+            </a:pPr>
+            <a:r>
+              <a:rPr lang="en-US" dirty="0" smtClean="0"/>
+              <a:t>Exams </a:t>
+            </a:r>
+            <a:r>
+              <a:rPr lang="en-US" dirty="0"/>
+              <a:t>ordering hard constraints must be </a:t>
+            </a:r>
+            <a:r>
+              <a:rPr lang="en-US" dirty="0" smtClean="0"/>
+              <a:t>followed (e.g., 1 AFTER 2);</a:t>
+            </a:r>
+          </a:p>
+          <a:p>
+            <a:pPr lvl="1">
+              <a:buFont typeface="Arial" panose="020B0604020202020204" pitchFamily="34" charset="0"/>
+              <a:buChar char="•"/>
+            </a:pPr>
+            <a:r>
+              <a:rPr lang="en-US" dirty="0" smtClean="0"/>
+              <a:t>Room </a:t>
+            </a:r>
+            <a:r>
+              <a:rPr lang="en-US" dirty="0"/>
+              <a:t>assignments hard constraints must be </a:t>
+            </a:r>
+            <a:r>
+              <a:rPr lang="en-US" dirty="0" smtClean="0"/>
+              <a:t>followed (e.g., </a:t>
+            </a:r>
+            <a:r>
+              <a:rPr lang="en-US" dirty="0"/>
+              <a:t>1 </a:t>
+            </a:r>
+            <a:r>
+              <a:rPr lang="en-US" dirty="0" smtClean="0"/>
+              <a:t>ROOM_EXCLUSIVE).</a:t>
+            </a:r>
+          </a:p>
+        </p:txBody>
+      </p:sp>
+    </p:spTree>
+    <p:extLst>
+      <p:ext uri="{BB962C8B-B14F-4D97-AF65-F5344CB8AC3E}">
+        <p14:creationId xmlns:p14="http://schemas.microsoft.com/office/powerpoint/2010/main" val="2849834468"/>
+      </p:ext>
+    </p:extLst>
+  </p:cSld>
+  <p:clrMapOvr>
+    <a:masterClrMapping/>
+  </p:clrMapOvr>
+  <p:timing>
+    <p:tnLst>
+      <p:par>
+        <p:cTn id="1" dur="indefinite" restart="never" nodeType="tmRoot"/>
+      </p:par>
+    </p:tnLst>
+  </p:timing>
+</p:sld>
+</file>
+
+<file path=ppt/slides/slide11.xml><?xml version="1.0" encoding="utf-8"?>
+<p:sld xmlns:a="http://schemas.openxmlformats.org/drawingml/2006/main" xmlns:r="http://schemas.openxmlformats.org/officeDocument/2006/relationships" xmlns:p="http://schemas.openxmlformats.org/presentationml/2006/main">
+  <p:cSld>
+    <p:spTree>
+      <p:nvGrpSpPr>
+        <p:cNvPr id="1" name=""/>
+        <p:cNvGrpSpPr/>
+        <p:nvPr/>
+      </p:nvGrpSpPr>
+      <p:grpSpPr>
+        <a:xfrm>
+          <a:off x="0" y="0"/>
+          <a:ext cx="0" cy="0"/>
+          <a:chOff x="0" y="0"/>
+          <a:chExt cx="0" cy="0"/>
+        </a:xfrm>
+      </p:grpSpPr>
+      <p:sp>
+        <p:nvSpPr>
+          <p:cNvPr id="2" name="Title 1"/>
+          <p:cNvSpPr>
+            <a:spLocks noGrp="1"/>
+          </p:cNvSpPr>
+          <p:nvPr>
+            <p:ph type="title"/>
+          </p:nvPr>
+        </p:nvSpPr>
+        <p:spPr/>
+        <p:txBody>
+          <a:bodyPr/>
+          <a:lstStyle/>
+          <a:p>
+            <a:r>
+              <a:rPr lang="en-US" dirty="0"/>
+              <a:t>ITC 2007 Examination timetabling problem</a:t>
+            </a:r>
+            <a:endParaRPr lang="pt-PT" dirty="0"/>
+          </a:p>
+        </p:txBody>
+      </p:sp>
+      <p:sp>
+        <p:nvSpPr>
+          <p:cNvPr id="3" name="Content Placeholder 2"/>
+          <p:cNvSpPr>
+            <a:spLocks noGrp="1"/>
+          </p:cNvSpPr>
+          <p:nvPr>
+            <p:ph idx="1"/>
+          </p:nvPr>
+        </p:nvSpPr>
+        <p:spPr/>
+        <p:txBody>
+          <a:bodyPr/>
+          <a:lstStyle/>
+          <a:p>
+            <a:pPr>
+              <a:buFont typeface="Arial" panose="020B0604020202020204" pitchFamily="34" charset="0"/>
+              <a:buChar char="•"/>
+            </a:pPr>
+            <a:r>
+              <a:rPr lang="en-US" dirty="0" smtClean="0"/>
+              <a:t> The soft constraints </a:t>
+            </a:r>
+            <a:r>
+              <a:rPr lang="en-US" dirty="0"/>
+              <a:t>are the following:</a:t>
+            </a:r>
+          </a:p>
+          <a:p>
+            <a:pPr lvl="1">
+              <a:buFont typeface="Arial" panose="020B0604020202020204" pitchFamily="34" charset="0"/>
+              <a:buChar char="•"/>
+            </a:pPr>
+            <a:r>
+              <a:rPr lang="en-US" dirty="0" smtClean="0"/>
+              <a:t>Two </a:t>
+            </a:r>
+            <a:r>
+              <a:rPr lang="en-US" dirty="0"/>
+              <a:t>exams in a row</a:t>
+            </a:r>
+            <a:r>
+              <a:rPr lang="en-US" dirty="0" smtClean="0"/>
+              <a:t>;</a:t>
+            </a:r>
+            <a:endParaRPr lang="en-US" dirty="0"/>
+          </a:p>
+          <a:p>
+            <a:pPr lvl="1">
+              <a:buFont typeface="Arial" panose="020B0604020202020204" pitchFamily="34" charset="0"/>
+              <a:buChar char="•"/>
+            </a:pPr>
+            <a:r>
+              <a:rPr lang="en-US" dirty="0" smtClean="0"/>
+              <a:t>Two </a:t>
+            </a:r>
+            <a:r>
+              <a:rPr lang="en-US" dirty="0"/>
+              <a:t>exams in a day</a:t>
+            </a:r>
+            <a:r>
+              <a:rPr lang="en-US" dirty="0" smtClean="0"/>
+              <a:t>;</a:t>
+            </a:r>
+            <a:endParaRPr lang="en-US" dirty="0"/>
+          </a:p>
+          <a:p>
+            <a:pPr lvl="1">
+              <a:buFont typeface="Arial" panose="020B0604020202020204" pitchFamily="34" charset="0"/>
+              <a:buChar char="•"/>
+            </a:pPr>
+            <a:r>
+              <a:rPr lang="en-US" dirty="0" smtClean="0"/>
+              <a:t>Period spread;</a:t>
+            </a:r>
+            <a:endParaRPr lang="en-US" dirty="0"/>
+          </a:p>
+          <a:p>
+            <a:pPr lvl="1">
+              <a:buFont typeface="Arial" panose="020B0604020202020204" pitchFamily="34" charset="0"/>
+              <a:buChar char="•"/>
+            </a:pPr>
+            <a:r>
+              <a:rPr lang="en-US" dirty="0" smtClean="0"/>
+              <a:t>Mixed durations;</a:t>
+            </a:r>
+            <a:endParaRPr lang="en-US" dirty="0"/>
+          </a:p>
+          <a:p>
+            <a:pPr lvl="1">
+              <a:buFont typeface="Arial" panose="020B0604020202020204" pitchFamily="34" charset="0"/>
+              <a:buChar char="•"/>
+            </a:pPr>
+            <a:r>
+              <a:rPr lang="en-US" dirty="0" smtClean="0"/>
+              <a:t>Larger exams constraints;</a:t>
+            </a:r>
+          </a:p>
+          <a:p>
+            <a:pPr lvl="1">
+              <a:buFont typeface="Arial" panose="020B0604020202020204" pitchFamily="34" charset="0"/>
+              <a:buChar char="•"/>
+            </a:pPr>
+            <a:r>
+              <a:rPr lang="en-US" dirty="0" smtClean="0"/>
+              <a:t>Room penalty</a:t>
+            </a:r>
+            <a:r>
+              <a:rPr lang="pt-PT" dirty="0" smtClean="0"/>
+              <a:t>;</a:t>
+            </a:r>
+          </a:p>
+          <a:p>
+            <a:pPr lvl="1">
+              <a:buFont typeface="Arial" panose="020B0604020202020204" pitchFamily="34" charset="0"/>
+              <a:buChar char="•"/>
+            </a:pPr>
+            <a:r>
+              <a:rPr lang="en-US" dirty="0" smtClean="0"/>
+              <a:t>Period penalty.</a:t>
+            </a:r>
+          </a:p>
+          <a:p>
+            <a:endParaRPr lang="pt-PT" dirty="0"/>
+          </a:p>
+        </p:txBody>
+      </p:sp>
+    </p:spTree>
+    <p:extLst>
+      <p:ext uri="{BB962C8B-B14F-4D97-AF65-F5344CB8AC3E}">
+        <p14:creationId xmlns:p14="http://schemas.microsoft.com/office/powerpoint/2010/main" val="3701611136"/>
+      </p:ext>
+    </p:extLst>
+  </p:cSld>
+  <p:clrMapOvr>
+    <a:masterClrMapping/>
+  </p:clrMapOvr>
+</p:sld>
+</file>
+
+<file path=ppt/slides/slide12.xml><?xml version="1.0" encoding="utf-8"?>
+<p:sld xmlns:a="http://schemas.openxmlformats.org/drawingml/2006/main" xmlns:r="http://schemas.openxmlformats.org/officeDocument/2006/relationships" xmlns:p="http://schemas.openxmlformats.org/presentationml/2006/main">
+  <p:cSld>
+    <p:spTree>
+      <p:nvGrpSpPr>
+        <p:cNvPr id="1" name=""/>
+        <p:cNvGrpSpPr/>
+        <p:nvPr/>
+      </p:nvGrpSpPr>
+      <p:grpSpPr>
+        <a:xfrm>
+          <a:off x="0" y="0"/>
+          <a:ext cx="0" cy="0"/>
+          <a:chOff x="0" y="0"/>
+          <a:chExt cx="0" cy="0"/>
+        </a:xfrm>
+      </p:grpSpPr>
+      <p:sp>
+        <p:nvSpPr>
+          <p:cNvPr id="2" name="Title 1"/>
+          <p:cNvSpPr>
+            <a:spLocks noGrp="1"/>
+          </p:cNvSpPr>
+          <p:nvPr>
+            <p:ph type="title"/>
+          </p:nvPr>
+        </p:nvSpPr>
+        <p:spPr/>
+        <p:txBody>
+          <a:bodyPr/>
+          <a:lstStyle/>
+          <a:p>
+            <a:r>
+              <a:rPr lang="en-US" dirty="0"/>
+              <a:t>System </a:t>
+            </a:r>
+            <a:r>
+              <a:rPr lang="en-US" dirty="0" smtClean="0"/>
+              <a:t>architecture</a:t>
+            </a:r>
+            <a:endParaRPr lang="pt-PT" dirty="0"/>
+          </a:p>
+        </p:txBody>
+      </p:sp>
+      <p:sp>
+        <p:nvSpPr>
+          <p:cNvPr id="3" name="Content Placeholder 2"/>
+          <p:cNvSpPr>
+            <a:spLocks noGrp="1"/>
+          </p:cNvSpPr>
+          <p:nvPr>
+            <p:ph idx="1"/>
+          </p:nvPr>
+        </p:nvSpPr>
+        <p:spPr/>
+        <p:txBody>
+          <a:bodyPr/>
+          <a:lstStyle/>
+          <a:p>
+            <a:endParaRPr lang="pt-PT"/>
+          </a:p>
+        </p:txBody>
+      </p:sp>
+    </p:spTree>
+    <p:extLst>
+      <p:ext uri="{BB962C8B-B14F-4D97-AF65-F5344CB8AC3E}">
+        <p14:creationId xmlns:p14="http://schemas.microsoft.com/office/powerpoint/2010/main" val="1191298998"/>
+      </p:ext>
+    </p:extLst>
+  </p:cSld>
+  <p:clrMapOvr>
+    <a:masterClrMapping/>
+  </p:clrMapOvr>
+</p:sld>
+</file>
+
 <file path=ppt/slides/slide2.xml><?xml version="1.0" encoding="utf-8"?>
 <p:sld xmlns:a="http://schemas.openxmlformats.org/drawingml/2006/main" xmlns:r="http://schemas.openxmlformats.org/officeDocument/2006/relationships" xmlns:p="http://schemas.openxmlformats.org/presentationml/2006/main">
   <p:cSld>
@@ -3924,10 +4425,10 @@
           <a:lstStyle/>
           <a:p>
             <a:r>
-              <a:rPr lang="pt-PT" dirty="0" smtClean="0"/>
-              <a:t>Índice</a:t>
-            </a:r>
-            <a:endParaRPr lang="pt-PT" dirty="0"/>
+              <a:rPr lang="en-US" dirty="0" smtClean="0"/>
+              <a:t>Index</a:t>
+            </a:r>
+            <a:endParaRPr lang="en-US" dirty="0"/>
           </a:p>
         </p:txBody>
       </p:sp>
@@ -3944,7 +4445,7 @@
         <p:spPr/>
         <p:txBody>
           <a:bodyPr>
-            <a:normAutofit fontScale="92500" lnSpcReduction="20000"/>
+            <a:normAutofit fontScale="85000" lnSpcReduction="20000"/>
           </a:bodyPr>
           <a:lstStyle/>
           <a:p>
@@ -3953,12 +4454,83 @@
               <a:buChar char="•"/>
             </a:pPr>
             <a:r>
-              <a:rPr lang="pt-PT" dirty="0"/>
+              <a:rPr lang="en-US" dirty="0" smtClean="0"/>
+              <a:t> Introduction</a:t>
+            </a:r>
+          </a:p>
+          <a:p>
+            <a:pPr lvl="1">
+              <a:buFont typeface="Arial" panose="020B0604020202020204" pitchFamily="34" charset="0"/>
+              <a:buChar char="•"/>
+            </a:pPr>
+            <a:r>
+              <a:rPr lang="en-US" dirty="0" smtClean="0"/>
+              <a:t>Educational Timetabling problems</a:t>
+            </a:r>
+          </a:p>
+          <a:p>
+            <a:pPr lvl="1">
+              <a:buFont typeface="Arial" panose="020B0604020202020204" pitchFamily="34" charset="0"/>
+              <a:buChar char="•"/>
+            </a:pPr>
+            <a:r>
+              <a:rPr lang="en-US" dirty="0" smtClean="0"/>
+              <a:t>Objectives</a:t>
+            </a:r>
+          </a:p>
+          <a:p>
+            <a:pPr>
+              <a:buFont typeface="Arial" panose="020B0604020202020204" pitchFamily="34" charset="0"/>
+              <a:buChar char="•"/>
+            </a:pPr>
+            <a:r>
+              <a:rPr lang="en-US" dirty="0" smtClean="0"/>
+              <a:t> Timetabling problem</a:t>
+            </a:r>
+          </a:p>
+          <a:p>
+            <a:pPr>
+              <a:buFont typeface="Arial" panose="020B0604020202020204" pitchFamily="34" charset="0"/>
+              <a:buChar char="•"/>
+            </a:pPr>
+            <a:r>
+              <a:rPr lang="en-US" dirty="0" smtClean="0"/>
+              <a:t> Types of approaches</a:t>
+            </a:r>
+          </a:p>
+          <a:p>
+            <a:pPr>
+              <a:buFont typeface="Arial" panose="020B0604020202020204" pitchFamily="34" charset="0"/>
+              <a:buChar char="•"/>
+            </a:pPr>
+            <a:r>
+              <a:rPr lang="en-US" dirty="0"/>
               <a:t> </a:t>
             </a:r>
             <a:r>
-              <a:rPr lang="pt-PT" dirty="0" smtClean="0"/>
-              <a:t>Introdução</a:t>
+              <a:rPr lang="en-US" dirty="0" smtClean="0"/>
+              <a:t>ITC2007 Examination timetabling problem</a:t>
+            </a:r>
+            <a:endParaRPr lang="en-US" dirty="0" smtClean="0"/>
+          </a:p>
+          <a:p>
+            <a:pPr>
+              <a:buFont typeface="Arial" panose="020B0604020202020204" pitchFamily="34" charset="0"/>
+              <a:buChar char="•"/>
+            </a:pPr>
+            <a:r>
+              <a:rPr lang="en-US" dirty="0" smtClean="0"/>
+              <a:t> System architecture</a:t>
+            </a:r>
+          </a:p>
+          <a:p>
+            <a:pPr>
+              <a:buFont typeface="Arial" panose="020B0604020202020204" pitchFamily="34" charset="0"/>
+              <a:buChar char="•"/>
+            </a:pPr>
+            <a:r>
+              <a:rPr lang="en-US" dirty="0" smtClean="0"/>
+              <a:t> Loader e solution initialization</a:t>
             </a:r>
           </a:p>
           <a:p>
@@ -3967,22 +4539,19 @@
               <a:buChar char="•"/>
             </a:pPr>
             <a:r>
-              <a:rPr lang="pt-PT" dirty="0" smtClean="0"/>
-              <a:t>Tipos de problemas de </a:t>
-            </a:r>
-            <a:r>
-              <a:rPr lang="pt-PT" dirty="0" err="1" smtClean="0"/>
-              <a:t>Educational</a:t>
-            </a:r>
-            <a:r>
-              <a:rPr lang="pt-PT" dirty="0" smtClean="0"/>
-              <a:t> </a:t>
-            </a:r>
-            <a:r>
-              <a:rPr lang="pt-PT" dirty="0" err="1" smtClean="0"/>
-              <a:t>Timetabling</a:t>
-            </a:r>
-            <a:endParaRPr lang="pt-PT" dirty="0"/>
+              <a:rPr lang="en-US" dirty="0" smtClean="0"/>
+              <a:t>Graph Coloring</a:t>
+            </a:r>
+          </a:p>
+          <a:p>
+            <a:pPr>
+              <a:buFont typeface="Arial" panose="020B0604020202020204" pitchFamily="34" charset="0"/>
+              <a:buChar char="•"/>
+            </a:pPr>
+            <a:r>
+              <a:rPr lang="en-US" dirty="0" smtClean="0"/>
+              <a:t> Proposed approach: Local Search</a:t>
+            </a:r>
           </a:p>
           <a:p>
             <a:pPr lvl="1">
@@ -3990,8 +4559,18 @@
               <a:buChar char="•"/>
             </a:pPr>
             <a:r>
-              <a:rPr lang="pt-PT" dirty="0" smtClean="0"/>
-              <a:t>Objetivos</a:t>
+              <a:rPr lang="en-US" dirty="0" smtClean="0"/>
+              <a:t>Simulated Annealing</a:t>
+            </a:r>
+          </a:p>
+          <a:p>
+            <a:pPr lvl="1">
+              <a:buFont typeface="Arial" panose="020B0604020202020204" pitchFamily="34" charset="0"/>
+              <a:buChar char="•"/>
+            </a:pPr>
+            <a:r>
+              <a:rPr lang="en-US" dirty="0" smtClean="0"/>
+              <a:t>Hill Climbing</a:t>
             </a:r>
           </a:p>
           <a:p>
@@ -4000,157 +4579,23 @@
               <a:buChar char="•"/>
             </a:pPr>
             <a:r>
-              <a:rPr lang="pt-PT" dirty="0" smtClean="0"/>
-              <a:t> </a:t>
-            </a:r>
-            <a:r>
-              <a:rPr lang="pt-PT" dirty="0" err="1" smtClean="0"/>
-              <a:t>Timetabling</a:t>
-            </a:r>
-            <a:r>
-              <a:rPr lang="pt-PT" dirty="0" smtClean="0"/>
-              <a:t> </a:t>
-            </a:r>
-            <a:r>
-              <a:rPr lang="pt-PT" dirty="0" err="1" smtClean="0"/>
-              <a:t>problem</a:t>
-            </a:r>
-            <a:endParaRPr lang="pt-PT" dirty="0" smtClean="0"/>
+              <a:rPr lang="en-US" dirty="0" smtClean="0"/>
+              <a:t> Results</a:t>
+            </a:r>
           </a:p>
           <a:p>
             <a:pPr>
               <a:buFont typeface="Arial" panose="020B0604020202020204" pitchFamily="34" charset="0"/>
               <a:buChar char="•"/>
             </a:pPr>
-            <a:r>
-              <a:rPr lang="pt-PT" dirty="0" smtClean="0"/>
-              <a:t> Diferentes tipos de abordagens</a:t>
-            </a:r>
-            <a:endParaRPr lang="pt-PT" dirty="0"/>
-          </a:p>
-          <a:p>
-            <a:pPr>
-              <a:buFont typeface="Arial" panose="020B0604020202020204" pitchFamily="34" charset="0"/>
-              <a:buChar char="•"/>
-            </a:pPr>
-            <a:r>
-              <a:rPr lang="pt-PT" dirty="0" smtClean="0"/>
-              <a:t> Arquitetura do sistema</a:t>
-            </a:r>
-          </a:p>
-          <a:p>
-            <a:pPr>
-              <a:buFont typeface="Arial" panose="020B0604020202020204" pitchFamily="34" charset="0"/>
-              <a:buChar char="•"/>
-            </a:pPr>
-            <a:r>
-              <a:rPr lang="pt-PT" dirty="0" smtClean="0"/>
-              <a:t> </a:t>
-            </a:r>
-            <a:r>
-              <a:rPr lang="pt-PT" dirty="0" err="1" smtClean="0"/>
-              <a:t>Loader</a:t>
-            </a:r>
-            <a:r>
-              <a:rPr lang="pt-PT" dirty="0" smtClean="0"/>
-              <a:t> e inicialização da solução</a:t>
-            </a:r>
+            <a:endParaRPr lang="en-US" dirty="0" smtClean="0"/>
           </a:p>
           <a:p>
             <a:pPr lvl="1">
               <a:buFont typeface="Arial" panose="020B0604020202020204" pitchFamily="34" charset="0"/>
               <a:buChar char="•"/>
             </a:pPr>
-            <a:r>
-              <a:rPr lang="pt-PT" dirty="0" err="1" smtClean="0"/>
-              <a:t>Graph</a:t>
-            </a:r>
-            <a:r>
-              <a:rPr lang="pt-PT" dirty="0" smtClean="0"/>
-              <a:t> </a:t>
-            </a:r>
-            <a:r>
-              <a:rPr lang="pt-PT" dirty="0" err="1" smtClean="0"/>
-              <a:t>Coloring</a:t>
-            </a:r>
-            <a:endParaRPr lang="pt-PT" dirty="0" smtClean="0"/>
-          </a:p>
-          <a:p>
-            <a:pPr>
-              <a:buFont typeface="Arial" panose="020B0604020202020204" pitchFamily="34" charset="0"/>
-              <a:buChar char="•"/>
-            </a:pPr>
-            <a:r>
-              <a:rPr lang="pt-PT" dirty="0" smtClean="0"/>
-              <a:t> Abordagem proposta : Local </a:t>
-            </a:r>
-            <a:r>
-              <a:rPr lang="pt-PT" dirty="0" err="1" smtClean="0"/>
-              <a:t>Search</a:t>
-            </a:r>
-            <a:endParaRPr lang="pt-PT" dirty="0" smtClean="0"/>
-          </a:p>
-          <a:p>
-            <a:pPr lvl="1">
-              <a:buFont typeface="Arial" panose="020B0604020202020204" pitchFamily="34" charset="0"/>
-              <a:buChar char="•"/>
-            </a:pPr>
-            <a:r>
-              <a:rPr lang="pt-PT" dirty="0" err="1" smtClean="0"/>
-              <a:t>Simulated</a:t>
-            </a:r>
-            <a:r>
-              <a:rPr lang="pt-PT" dirty="0" smtClean="0"/>
-              <a:t> </a:t>
-            </a:r>
-            <a:r>
-              <a:rPr lang="pt-PT" dirty="0" err="1" smtClean="0"/>
-              <a:t>Annealing</a:t>
-            </a:r>
-            <a:endParaRPr lang="pt-PT" dirty="0" smtClean="0"/>
-          </a:p>
-          <a:p>
-            <a:pPr lvl="1">
-              <a:buFont typeface="Arial" panose="020B0604020202020204" pitchFamily="34" charset="0"/>
-              <a:buChar char="•"/>
-            </a:pPr>
-            <a:r>
-              <a:rPr lang="pt-PT" dirty="0" smtClean="0"/>
-              <a:t>Hill </a:t>
-            </a:r>
-            <a:r>
-              <a:rPr lang="pt-PT" dirty="0" err="1" smtClean="0"/>
-              <a:t>Climbing</a:t>
-            </a:r>
-            <a:endParaRPr lang="pt-PT" dirty="0" smtClean="0"/>
-          </a:p>
-          <a:p>
-            <a:pPr>
-              <a:buFont typeface="Arial" panose="020B0604020202020204" pitchFamily="34" charset="0"/>
-              <a:buChar char="•"/>
-            </a:pPr>
-            <a:r>
-              <a:rPr lang="pt-PT" dirty="0"/>
-              <a:t> </a:t>
-            </a:r>
-            <a:r>
-              <a:rPr lang="pt-PT" dirty="0" smtClean="0"/>
-              <a:t>Resultados</a:t>
-            </a:r>
-          </a:p>
-          <a:p>
-            <a:pPr>
-              <a:buFont typeface="Arial" panose="020B0604020202020204" pitchFamily="34" charset="0"/>
-              <a:buChar char="•"/>
-            </a:pPr>
-            <a:endParaRPr lang="pt-PT" dirty="0" smtClean="0"/>
-          </a:p>
-          <a:p>
-            <a:pPr lvl="1">
-              <a:buFont typeface="Arial" panose="020B0604020202020204" pitchFamily="34" charset="0"/>
-              <a:buChar char="•"/>
-            </a:pPr>
-            <a:endParaRPr lang="pt-PT" dirty="0" smtClean="0"/>
+            <a:endParaRPr lang="en-US" dirty="0" smtClean="0"/>
           </a:p>
         </p:txBody>
       </p:sp>
@@ -4207,10 +4652,10 @@
           <a:lstStyle/>
           <a:p>
             <a:r>
-              <a:rPr lang="pt-PT" dirty="0" smtClean="0"/>
-              <a:t>Introdução</a:t>
-            </a:r>
-            <a:endParaRPr lang="pt-PT" dirty="0"/>
+              <a:rPr lang="en-US" dirty="0" smtClean="0"/>
+              <a:t>Introduction</a:t>
+            </a:r>
+            <a:endParaRPr lang="en-US" dirty="0"/>
           </a:p>
         </p:txBody>
       </p:sp>
@@ -4241,10 +4686,6 @@
               <a:buChar char=" "/>
             </a:pPr>
             <a:r>
-              <a:rPr lang="pt-PT" dirty="0"/>
-              <a:t>Tipos de problemas de </a:t>
-            </a:r>
-            <a:r>
               <a:rPr lang="en-US" dirty="0" smtClean="0"/>
               <a:t>Educational</a:t>
             </a:r>
@@ -4254,12 +4695,13 @@
             </a:r>
             <a:r>
               <a:rPr lang="en-US" dirty="0" smtClean="0"/>
-              <a:t>Timetabling</a:t>
+              <a:t>Timetabling problems</a:t>
             </a:r>
             <a:r>
               <a:rPr lang="pt-PT" dirty="0" smtClean="0"/>
               <a:t>:</a:t>
             </a:r>
+            <a:endParaRPr lang="pt-PT" dirty="0" smtClean="0"/>
           </a:p>
           <a:p>
             <a:pPr marL="285750" lvl="1" indent="-285750">
@@ -4274,20 +4716,8 @@
               <a:buChar char="•"/>
             </a:pPr>
             <a:r>
-              <a:rPr lang="pt-PT" dirty="0" err="1" smtClean="0"/>
-              <a:t>Examination</a:t>
-            </a:r>
-            <a:r>
-              <a:rPr lang="pt-PT" dirty="0" smtClean="0"/>
-              <a:t> </a:t>
-            </a:r>
-            <a:r>
-              <a:rPr lang="pt-PT" dirty="0" err="1" smtClean="0"/>
-              <a:t>Timetabling</a:t>
-            </a:r>
-            <a:r>
-              <a:rPr lang="pt-PT" dirty="0" smtClean="0"/>
-              <a:t>;</a:t>
+              <a:rPr lang="en-US" dirty="0" smtClean="0"/>
+              <a:t>Examination Timetabling;</a:t>
             </a:r>
           </a:p>
           <a:p>
@@ -4303,20 +4733,8 @@
               <a:buChar char="•"/>
             </a:pPr>
             <a:r>
-              <a:rPr lang="pt-PT" dirty="0" err="1" smtClean="0"/>
-              <a:t>Course</a:t>
-            </a:r>
-            <a:r>
-              <a:rPr lang="pt-PT" dirty="0" smtClean="0"/>
-              <a:t> </a:t>
-            </a:r>
-            <a:r>
-              <a:rPr lang="pt-PT" dirty="0" err="1" smtClean="0"/>
-              <a:t>Timetabling</a:t>
-            </a:r>
-            <a:r>
-              <a:rPr lang="pt-PT" dirty="0" smtClean="0"/>
-              <a:t>;</a:t>
+              <a:rPr lang="en-US" dirty="0" smtClean="0"/>
+              <a:t>Course Timetabling;</a:t>
             </a:r>
           </a:p>
           <a:p>
@@ -4332,20 +4750,8 @@
               <a:buChar char="•"/>
             </a:pPr>
             <a:r>
-              <a:rPr lang="pt-PT" dirty="0" err="1" smtClean="0"/>
-              <a:t>School</a:t>
-            </a:r>
-            <a:r>
-              <a:rPr lang="pt-PT" dirty="0" smtClean="0"/>
-              <a:t> </a:t>
-            </a:r>
-            <a:r>
-              <a:rPr lang="pt-PT" dirty="0" err="1" smtClean="0"/>
-              <a:t>Timetabling</a:t>
-            </a:r>
-            <a:r>
-              <a:rPr lang="pt-PT" dirty="0" smtClean="0"/>
-              <a:t>.</a:t>
+              <a:rPr lang="en-US" dirty="0" smtClean="0"/>
+              <a:t>School Timetabling.</a:t>
             </a:r>
           </a:p>
           <a:p>
@@ -4359,7 +4765,7 @@
               <a:buSzPct val="100000"/>
               <a:buNone/>
             </a:pPr>
-            <a:endParaRPr lang="pt-PT" dirty="0"/>
+            <a:endParaRPr lang="en-US" dirty="0" smtClean="0"/>
           </a:p>
           <a:p>
             <a:pPr marL="0" lvl="1" indent="0">
@@ -4373,24 +4779,8 @@
               <a:buNone/>
             </a:pPr>
             <a:r>
-              <a:rPr lang="pt-PT" dirty="0" smtClean="0"/>
-              <a:t> Cada tipo de problema terá de seguir certas </a:t>
-            </a:r>
-            <a:r>
-              <a:rPr lang="pt-PT" dirty="0" err="1" smtClean="0"/>
-              <a:t>regreas</a:t>
-            </a:r>
-            <a:r>
-              <a:rPr lang="pt-PT" dirty="0" smtClean="0"/>
-              <a:t> (</a:t>
-            </a:r>
-            <a:r>
-              <a:rPr lang="pt-PT" i="1" dirty="0" err="1" smtClean="0"/>
-              <a:t>constraints</a:t>
-            </a:r>
-            <a:r>
-              <a:rPr lang="pt-PT" dirty="0" smtClean="0"/>
-              <a:t>):</a:t>
+              <a:rPr lang="en-US" dirty="0" smtClean="0"/>
+              <a:t> Each type of problem must follow different types of constraints:</a:t>
             </a:r>
           </a:p>
           <a:p>
@@ -4406,16 +4796,8 @@
               <a:buChar char="•"/>
             </a:pPr>
             <a:r>
-              <a:rPr lang="pt-PT" dirty="0" smtClean="0"/>
-              <a:t>Hard </a:t>
-            </a:r>
-            <a:r>
-              <a:rPr lang="pt-PT" dirty="0" err="1" smtClean="0"/>
-              <a:t>constraints</a:t>
-            </a:r>
-            <a:r>
-              <a:rPr lang="pt-PT" dirty="0" smtClean="0"/>
-              <a:t>;</a:t>
+              <a:rPr lang="en-US" dirty="0" smtClean="0"/>
+              <a:t>Hard constraints;</a:t>
             </a:r>
           </a:p>
           <a:p>
@@ -4431,18 +4813,10 @@
               <a:buChar char="•"/>
             </a:pPr>
             <a:r>
-              <a:rPr lang="pt-PT" dirty="0" smtClean="0"/>
-              <a:t>Soft </a:t>
-            </a:r>
-            <a:r>
-              <a:rPr lang="pt-PT" dirty="0" err="1" smtClean="0"/>
-              <a:t>constraints</a:t>
-            </a:r>
-            <a:r>
-              <a:rPr lang="pt-PT" dirty="0" smtClean="0"/>
-              <a:t>.</a:t>
-            </a:r>
-            <a:endParaRPr lang="pt-PT" dirty="0"/>
+              <a:rPr lang="en-US" dirty="0" smtClean="0"/>
+              <a:t>Soft constraints.</a:t>
+            </a:r>
+            <a:endParaRPr lang="en-US" dirty="0"/>
           </a:p>
         </p:txBody>
       </p:sp>
@@ -4499,10 +4873,10 @@
           <a:lstStyle/>
           <a:p>
             <a:r>
-              <a:rPr lang="pt-PT" dirty="0" smtClean="0"/>
-              <a:t>Introdução</a:t>
-            </a:r>
-            <a:endParaRPr lang="pt-PT" dirty="0"/>
+              <a:rPr lang="en-US" dirty="0" smtClean="0"/>
+              <a:t>Introduction</a:t>
+            </a:r>
+            <a:endParaRPr lang="en-US" dirty="0"/>
           </a:p>
         </p:txBody>
       </p:sp>
@@ -4522,8 +4896,8 @@
           <a:lstStyle/>
           <a:p>
             <a:r>
-              <a:rPr lang="pt-PT" dirty="0" smtClean="0"/>
-              <a:t>Objetivos deste projeto:</a:t>
+              <a:rPr lang="en-US" dirty="0" smtClean="0"/>
+              <a:t>The main objectives of this project are:</a:t>
             </a:r>
           </a:p>
           <a:p>
@@ -4532,32 +4906,46 @@
               <a:buChar char="•"/>
             </a:pPr>
             <a:r>
-              <a:rPr lang="pt-PT" dirty="0" smtClean="0"/>
-              <a:t> Desenvolver um gerador automático de horários de exames, considerando as especificações do </a:t>
-            </a:r>
-            <a:r>
-              <a:rPr lang="pt-PT" dirty="0" err="1" smtClean="0"/>
-              <a:t>International</a:t>
-            </a:r>
-            <a:r>
-              <a:rPr lang="pt-PT" dirty="0" smtClean="0"/>
+              <a:rPr lang="en-US" dirty="0" smtClean="0"/>
               <a:t> </a:t>
             </a:r>
             <a:r>
-              <a:rPr lang="pt-PT" dirty="0" err="1" smtClean="0"/>
-              <a:t>Timetable</a:t>
-            </a:r>
-            <a:r>
-              <a:rPr lang="pt-PT" dirty="0" smtClean="0"/>
+              <a:rPr lang="en-US" dirty="0"/>
+              <a:t>Automated generation of examination timetables, considering the </a:t>
+            </a:r>
+            <a:r>
+              <a:rPr lang="en-US" dirty="0" smtClean="0"/>
+              <a:t>International Timetabling Competition 2007 specifications</a:t>
+            </a:r>
+            <a:r>
+              <a:rPr lang="en-US" dirty="0" smtClean="0"/>
+              <a:t>;</a:t>
+            </a:r>
+          </a:p>
+          <a:p>
+            <a:pPr>
+              <a:buFont typeface="Arial" panose="020B0604020202020204" pitchFamily="34" charset="0"/>
+              <a:buChar char="•"/>
+            </a:pPr>
+            <a:r>
+              <a:rPr lang="en-US" dirty="0" smtClean="0"/>
               <a:t> </a:t>
             </a:r>
             <a:r>
-              <a:rPr lang="pt-PT" dirty="0" err="1" smtClean="0"/>
-              <a:t>Competition</a:t>
-            </a:r>
-            <a:r>
-              <a:rPr lang="pt-PT" dirty="0" smtClean="0"/>
-              <a:t> 2007;</a:t>
+              <a:rPr lang="en-US" dirty="0"/>
+              <a:t>Validation </a:t>
+            </a:r>
+            <a:r>
+              <a:rPr lang="en-US" dirty="0" smtClean="0"/>
+              <a:t>of </a:t>
+            </a:r>
+            <a:r>
+              <a:rPr lang="en-US" dirty="0"/>
+              <a:t>a timetable provided by the </a:t>
+            </a:r>
+            <a:r>
+              <a:rPr lang="en-US" dirty="0" smtClean="0"/>
+              <a:t>user;</a:t>
             </a:r>
           </a:p>
           <a:p>
@@ -4566,28 +4954,22 @@
               <a:buChar char="•"/>
             </a:pPr>
             <a:r>
-              <a:rPr lang="pt-PT" dirty="0"/>
+              <a:rPr lang="en-US" dirty="0" smtClean="0"/>
               <a:t> </a:t>
             </a:r>
             <a:r>
-              <a:rPr lang="pt-PT" dirty="0" smtClean="0"/>
-              <a:t>Desenvolver um validador de soluções;</a:t>
-            </a:r>
-          </a:p>
-          <a:p>
-            <a:pPr>
-              <a:buFont typeface="Arial" panose="020B0604020202020204" pitchFamily="34" charset="0"/>
-              <a:buChar char="•"/>
-            </a:pPr>
-            <a:r>
-              <a:rPr lang="pt-PT" dirty="0"/>
-              <a:t> </a:t>
-            </a:r>
-            <a:r>
-              <a:rPr lang="pt-PT" dirty="0" smtClean="0"/>
-              <a:t>Desenvolver um GUI para visualizar as soluções finais (opcional).</a:t>
-            </a:r>
-            <a:endParaRPr lang="pt-PT" dirty="0"/>
+              <a:rPr lang="en-US" dirty="0" smtClean="0"/>
+              <a:t>Graphical </a:t>
+            </a:r>
+            <a:r>
+              <a:rPr lang="en-US" dirty="0"/>
+              <a:t>User Interface to allow the user to </a:t>
+            </a:r>
+            <a:r>
+              <a:rPr lang="en-US" dirty="0" smtClean="0"/>
+              <a:t>check the final generated solution.</a:t>
+            </a:r>
+            <a:endParaRPr lang="en-US" dirty="0"/>
           </a:p>
         </p:txBody>
       </p:sp>
@@ -4644,57 +5026,84 @@
           <a:lstStyle/>
           <a:p>
             <a:r>
-              <a:rPr lang="pt-PT" dirty="0" err="1" smtClean="0"/>
-              <a:t>Timetabling</a:t>
-            </a:r>
-            <a:r>
-              <a:rPr lang="pt-PT" dirty="0" smtClean="0"/>
+              <a:rPr lang="en-US" dirty="0" smtClean="0"/>
+              <a:t>Timetabling problem</a:t>
+            </a:r>
+            <a:endParaRPr lang="en-US" dirty="0"/>
+          </a:p>
+        </p:txBody>
+      </p:sp>
+      <p:sp>
+        <p:nvSpPr>
+          <p:cNvPr id="3" name="Content Placeholder 2"/>
+          <p:cNvSpPr>
+            <a:spLocks noGrp="1"/>
+          </p:cNvSpPr>
+          <p:nvPr>
+            <p:ph idx="1"/>
+          </p:nvPr>
+        </p:nvSpPr>
+        <p:spPr/>
+        <p:txBody>
+          <a:bodyPr>
+            <a:normAutofit/>
+          </a:bodyPr>
+          <a:lstStyle/>
+          <a:p>
+            <a:r>
+              <a:rPr lang="en-US" dirty="0"/>
+              <a:t>The timetabling problem may be formulated as </a:t>
+            </a:r>
+            <a:r>
+              <a:rPr lang="en-US" dirty="0" smtClean="0"/>
+              <a:t>multiple types of problems</a:t>
+            </a:r>
+            <a:r>
+              <a:rPr lang="en-US" dirty="0" smtClean="0"/>
+              <a:t>:</a:t>
+            </a:r>
+          </a:p>
+          <a:p>
+            <a:pPr>
+              <a:buFont typeface="Arial" panose="020B0604020202020204" pitchFamily="34" charset="0"/>
+              <a:buChar char="•"/>
+            </a:pPr>
+            <a:r>
+              <a:rPr lang="en-US" dirty="0" smtClean="0"/>
+              <a:t> Search problem;</a:t>
+            </a:r>
+          </a:p>
+          <a:p>
+            <a:pPr>
+              <a:buFont typeface="Arial" panose="020B0604020202020204" pitchFamily="34" charset="0"/>
+              <a:buChar char="•"/>
+            </a:pPr>
+            <a:r>
+              <a:rPr lang="en-US" dirty="0" smtClean="0"/>
+              <a:t> Optimization problem.</a:t>
+            </a:r>
+          </a:p>
+          <a:p>
+            <a:pPr marL="0" indent="0">
+              <a:buNone/>
+            </a:pPr>
+            <a:endParaRPr lang="en-US" dirty="0" smtClean="0"/>
+          </a:p>
+          <a:p>
+            <a:pPr marL="0" indent="0">
+              <a:buNone/>
+            </a:pPr>
+            <a:r>
+              <a:rPr lang="en-US" dirty="0" smtClean="0"/>
               <a:t> </a:t>
             </a:r>
             <a:r>
-              <a:rPr lang="pt-PT" dirty="0" err="1" smtClean="0"/>
-              <a:t>problem</a:t>
-            </a:r>
-            <a:endParaRPr lang="pt-PT" dirty="0"/>
-          </a:p>
-        </p:txBody>
-      </p:sp>
-      <p:sp>
-        <p:nvSpPr>
-          <p:cNvPr id="3" name="Content Placeholder 2"/>
-          <p:cNvSpPr>
-            <a:spLocks noGrp="1"/>
-          </p:cNvSpPr>
-          <p:nvPr>
-            <p:ph idx="1"/>
-          </p:nvPr>
-        </p:nvSpPr>
-        <p:spPr/>
-        <p:txBody>
-          <a:bodyPr>
-            <a:normAutofit fontScale="92500" lnSpcReduction="20000"/>
-          </a:bodyPr>
-          <a:lstStyle/>
-          <a:p>
-            <a:r>
-              <a:rPr lang="pt-PT" dirty="0" smtClean="0"/>
-              <a:t>Um </a:t>
-            </a:r>
-            <a:r>
-              <a:rPr lang="pt-PT" i="1" dirty="0" err="1" smtClean="0"/>
-              <a:t>timetabling</a:t>
-            </a:r>
-            <a:r>
-              <a:rPr lang="pt-PT" i="1" dirty="0" smtClean="0"/>
-              <a:t> </a:t>
-            </a:r>
-            <a:r>
-              <a:rPr lang="pt-PT" i="1" dirty="0" err="1" smtClean="0"/>
-              <a:t>problem</a:t>
-            </a:r>
-            <a:r>
-              <a:rPr lang="pt-PT" dirty="0" smtClean="0"/>
-              <a:t> pode ser abordado como:</a:t>
+              <a:rPr lang="en-US" dirty="0"/>
+              <a:t>When solving timetabling problems, it is possible to generate one of multiple types of solutions</a:t>
+            </a:r>
+            <a:r>
+              <a:rPr lang="en-US" dirty="0" smtClean="0"/>
+              <a:t>:</a:t>
             </a:r>
           </a:p>
           <a:p>
@@ -4703,8 +5112,8 @@
               <a:buChar char="•"/>
             </a:pPr>
             <a:r>
-              <a:rPr lang="pt-PT" dirty="0" smtClean="0"/>
-              <a:t> Problema de procura;</a:t>
+              <a:rPr lang="en-US" dirty="0" smtClean="0"/>
+              <a:t> Feasible;</a:t>
             </a:r>
           </a:p>
           <a:p>
@@ -4713,12 +5122,8 @@
               <a:buChar char="•"/>
             </a:pPr>
             <a:r>
-              <a:rPr lang="pt-PT" dirty="0"/>
-              <a:t> </a:t>
-            </a:r>
-            <a:r>
-              <a:rPr lang="pt-PT" dirty="0" smtClean="0"/>
-              <a:t>Problema de otimização;</a:t>
+              <a:rPr lang="en-US" dirty="0" smtClean="0"/>
+              <a:t> Non feasible;</a:t>
             </a:r>
           </a:p>
           <a:p>
@@ -4727,12 +5132,8 @@
               <a:buChar char="•"/>
             </a:pPr>
             <a:r>
-              <a:rPr lang="pt-PT" dirty="0"/>
-              <a:t> </a:t>
-            </a:r>
-            <a:r>
-              <a:rPr lang="pt-PT" dirty="0" smtClean="0"/>
-              <a:t>Problema hibrido.</a:t>
+              <a:rPr lang="en-US" dirty="0" smtClean="0"/>
+              <a:t> Optimal;</a:t>
             </a:r>
           </a:p>
           <a:p>
@@ -4740,75 +5141,9 @@
               <a:buFont typeface="Arial" panose="020B0604020202020204" pitchFamily="34" charset="0"/>
               <a:buChar char="•"/>
             </a:pPr>
-            <a:endParaRPr lang="pt-PT" dirty="0"/>
-          </a:p>
-          <a:p>
-            <a:pPr marL="0" indent="0">
-              <a:buNone/>
-            </a:pPr>
-            <a:r>
-              <a:rPr lang="pt-PT" dirty="0"/>
-              <a:t> </a:t>
-            </a:r>
-            <a:r>
-              <a:rPr lang="pt-PT" dirty="0" smtClean="0"/>
-              <a:t>As soluções para este problema podem ser de vários tipos:</a:t>
-            </a:r>
-          </a:p>
-          <a:p>
-            <a:pPr>
-              <a:buFont typeface="Arial" panose="020B0604020202020204" pitchFamily="34" charset="0"/>
-              <a:buChar char="•"/>
-            </a:pPr>
-            <a:r>
-              <a:rPr lang="pt-PT" dirty="0" smtClean="0"/>
-              <a:t> Fazível;</a:t>
-            </a:r>
-          </a:p>
-          <a:p>
-            <a:pPr>
-              <a:buFont typeface="Arial" panose="020B0604020202020204" pitchFamily="34" charset="0"/>
-              <a:buChar char="•"/>
-            </a:pPr>
-            <a:r>
-              <a:rPr lang="pt-PT" dirty="0"/>
-              <a:t> </a:t>
-            </a:r>
-            <a:r>
-              <a:rPr lang="pt-PT" dirty="0" smtClean="0"/>
-              <a:t>Não fazível;</a:t>
-            </a:r>
-          </a:p>
-          <a:p>
-            <a:pPr>
-              <a:buFont typeface="Arial" panose="020B0604020202020204" pitchFamily="34" charset="0"/>
-              <a:buChar char="•"/>
-            </a:pPr>
-            <a:r>
-              <a:rPr lang="pt-PT" dirty="0"/>
-              <a:t> </a:t>
-            </a:r>
-            <a:r>
-              <a:rPr lang="pt-PT" dirty="0" smtClean="0"/>
-              <a:t>Ótima;</a:t>
-            </a:r>
-          </a:p>
-          <a:p>
-            <a:pPr>
-              <a:buFont typeface="Arial" panose="020B0604020202020204" pitchFamily="34" charset="0"/>
-              <a:buChar char="•"/>
-            </a:pPr>
-            <a:r>
-              <a:rPr lang="pt-PT" dirty="0"/>
-              <a:t> </a:t>
-            </a:r>
-            <a:r>
-              <a:rPr lang="pt-PT" dirty="0" err="1" smtClean="0"/>
-              <a:t>Sub-ótima</a:t>
-            </a:r>
-            <a:r>
-              <a:rPr lang="pt-PT" dirty="0" smtClean="0"/>
-              <a:t>.</a:t>
+            <a:r>
+              <a:rPr lang="en-US" dirty="0" smtClean="0"/>
+              <a:t> Sub-optimal.</a:t>
             </a:r>
           </a:p>
           <a:p>
@@ -4820,6 +5155,656 @@
     <p:extLst>
       <p:ext uri="{BB962C8B-B14F-4D97-AF65-F5344CB8AC3E}">
         <p14:creationId xmlns:p14="http://schemas.microsoft.com/office/powerpoint/2010/main" val="914583279"/>
+      </p:ext>
+    </p:extLst>
+  </p:cSld>
+  <p:clrMapOvr>
+    <a:masterClrMapping/>
+  </p:clrMapOvr>
+  <p:timing>
+    <p:tnLst>
+      <p:par>
+        <p:cTn id="1" dur="indefinite" restart="never" nodeType="tmRoot"/>
+      </p:par>
+    </p:tnLst>
+  </p:timing>
+</p:sld>
+</file>
+
+<file path=ppt/slides/slide6.xml><?xml version="1.0" encoding="utf-8"?>
+<p:sld xmlns:a="http://schemas.openxmlformats.org/drawingml/2006/main" xmlns:r="http://schemas.openxmlformats.org/officeDocument/2006/relationships" xmlns:p="http://schemas.openxmlformats.org/presentationml/2006/main">
+  <p:cSld>
+    <p:spTree>
+      <p:nvGrpSpPr>
+        <p:cNvPr id="1" name=""/>
+        <p:cNvGrpSpPr/>
+        <p:nvPr/>
+      </p:nvGrpSpPr>
+      <p:grpSpPr>
+        <a:xfrm>
+          <a:off x="0" y="0"/>
+          <a:ext cx="0" cy="0"/>
+          <a:chOff x="0" y="0"/>
+          <a:chExt cx="0" cy="0"/>
+        </a:xfrm>
+      </p:grpSpPr>
+      <p:sp>
+        <p:nvSpPr>
+          <p:cNvPr id="2" name="Title 1"/>
+          <p:cNvSpPr>
+            <a:spLocks noGrp="1"/>
+          </p:cNvSpPr>
+          <p:nvPr>
+            <p:ph type="title"/>
+          </p:nvPr>
+        </p:nvSpPr>
+        <p:spPr/>
+        <p:txBody>
+          <a:bodyPr/>
+          <a:lstStyle/>
+          <a:p>
+            <a:r>
+              <a:rPr lang="en-US" dirty="0"/>
+              <a:t>Types of </a:t>
+            </a:r>
+            <a:r>
+              <a:rPr lang="en-US" dirty="0" smtClean="0"/>
+              <a:t>approaches</a:t>
+            </a:r>
+            <a:endParaRPr lang="pt-PT" dirty="0"/>
+          </a:p>
+        </p:txBody>
+      </p:sp>
+      <p:sp>
+        <p:nvSpPr>
+          <p:cNvPr id="3" name="Content Placeholder 2"/>
+          <p:cNvSpPr>
+            <a:spLocks noGrp="1"/>
+          </p:cNvSpPr>
+          <p:nvPr>
+            <p:ph idx="1"/>
+          </p:nvPr>
+        </p:nvSpPr>
+        <p:spPr/>
+        <p:txBody>
+          <a:bodyPr/>
+          <a:lstStyle/>
+          <a:p>
+            <a:r>
+              <a:rPr lang="en-US" dirty="0" smtClean="0"/>
+              <a:t>There are plenty of types of approaches to use in order to try to solve a timetabling problem:</a:t>
+            </a:r>
+          </a:p>
+          <a:p>
+            <a:pPr>
+              <a:buFont typeface="Arial" panose="020B0604020202020204" pitchFamily="34" charset="0"/>
+              <a:buChar char="•"/>
+            </a:pPr>
+            <a:r>
+              <a:rPr lang="en-US" dirty="0" smtClean="0"/>
+              <a:t> Exact algorithms;</a:t>
+            </a:r>
+          </a:p>
+          <a:p>
+            <a:pPr>
+              <a:buFont typeface="Arial" panose="020B0604020202020204" pitchFamily="34" charset="0"/>
+              <a:buChar char="•"/>
+            </a:pPr>
+            <a:r>
+              <a:rPr lang="en-US" dirty="0"/>
+              <a:t> </a:t>
+            </a:r>
+            <a:r>
+              <a:rPr lang="en-US" dirty="0" smtClean="0"/>
+              <a:t>Graph Coloring Based techniques;</a:t>
+            </a:r>
+          </a:p>
+          <a:p>
+            <a:pPr>
+              <a:buFont typeface="Arial" panose="020B0604020202020204" pitchFamily="34" charset="0"/>
+              <a:buChar char="•"/>
+            </a:pPr>
+            <a:r>
+              <a:rPr lang="en-US" dirty="0"/>
+              <a:t> </a:t>
+            </a:r>
+            <a:r>
+              <a:rPr lang="en-US" dirty="0" smtClean="0"/>
+              <a:t>Single-solution based meta-heuristics;</a:t>
+            </a:r>
+          </a:p>
+          <a:p>
+            <a:pPr>
+              <a:buFont typeface="Arial" panose="020B0604020202020204" pitchFamily="34" charset="0"/>
+              <a:buChar char="•"/>
+            </a:pPr>
+            <a:r>
+              <a:rPr lang="en-US" dirty="0" smtClean="0"/>
+              <a:t> Population based </a:t>
+            </a:r>
+            <a:r>
+              <a:rPr lang="en-US" dirty="0"/>
+              <a:t>meta-heuristics</a:t>
+            </a:r>
+            <a:r>
+              <a:rPr lang="en-US" dirty="0" smtClean="0"/>
+              <a:t>;</a:t>
+            </a:r>
+          </a:p>
+          <a:p>
+            <a:pPr>
+              <a:buFont typeface="Arial" panose="020B0604020202020204" pitchFamily="34" charset="0"/>
+              <a:buChar char="•"/>
+            </a:pPr>
+            <a:r>
+              <a:rPr lang="en-US" dirty="0"/>
+              <a:t> </a:t>
+            </a:r>
+            <a:r>
+              <a:rPr lang="en-US" dirty="0" smtClean="0"/>
+              <a:t>Multi-criteria techniques</a:t>
+            </a:r>
+            <a:r>
+              <a:rPr lang="pt-PT" dirty="0" smtClean="0"/>
+              <a:t>;</a:t>
+            </a:r>
+          </a:p>
+          <a:p>
+            <a:pPr>
+              <a:buFont typeface="Arial" panose="020B0604020202020204" pitchFamily="34" charset="0"/>
+              <a:buChar char="•"/>
+            </a:pPr>
+            <a:r>
+              <a:rPr lang="en-US" dirty="0"/>
+              <a:t> </a:t>
+            </a:r>
+            <a:r>
+              <a:rPr lang="en-US" dirty="0" smtClean="0"/>
+              <a:t>Hyper-heuristics</a:t>
+            </a:r>
+            <a:r>
+              <a:rPr lang="pt-PT" dirty="0" smtClean="0"/>
+              <a:t>;</a:t>
+            </a:r>
+          </a:p>
+          <a:p>
+            <a:pPr>
+              <a:buFont typeface="Arial" panose="020B0604020202020204" pitchFamily="34" charset="0"/>
+              <a:buChar char="•"/>
+            </a:pPr>
+            <a:r>
+              <a:rPr lang="pt-PT" dirty="0" smtClean="0"/>
+              <a:t> </a:t>
+            </a:r>
+            <a:r>
+              <a:rPr lang="en-US" dirty="0" smtClean="0"/>
+              <a:t>Decomposition/clustering techniques</a:t>
+            </a:r>
+            <a:r>
+              <a:rPr lang="pt-PT" dirty="0" smtClean="0"/>
+              <a:t>.</a:t>
+            </a:r>
+            <a:endParaRPr lang="en-US" dirty="0"/>
+          </a:p>
+        </p:txBody>
+      </p:sp>
+    </p:spTree>
+    <p:extLst>
+      <p:ext uri="{BB962C8B-B14F-4D97-AF65-F5344CB8AC3E}">
+        <p14:creationId xmlns:p14="http://schemas.microsoft.com/office/powerpoint/2010/main" val="2619747277"/>
+      </p:ext>
+    </p:extLst>
+  </p:cSld>
+  <p:clrMapOvr>
+    <a:masterClrMapping/>
+  </p:clrMapOvr>
+  <p:timing>
+    <p:tnLst>
+      <p:par>
+        <p:cTn id="1" dur="indefinite" restart="never" nodeType="tmRoot"/>
+      </p:par>
+    </p:tnLst>
+  </p:timing>
+</p:sld>
+</file>
+
+<file path=ppt/slides/slide7.xml><?xml version="1.0" encoding="utf-8"?>
+<p:sld xmlns:a="http://schemas.openxmlformats.org/drawingml/2006/main" xmlns:r="http://schemas.openxmlformats.org/officeDocument/2006/relationships" xmlns:p="http://schemas.openxmlformats.org/presentationml/2006/main">
+  <p:cSld>
+    <p:spTree>
+      <p:nvGrpSpPr>
+        <p:cNvPr id="1" name=""/>
+        <p:cNvGrpSpPr/>
+        <p:nvPr/>
+      </p:nvGrpSpPr>
+      <p:grpSpPr>
+        <a:xfrm>
+          <a:off x="0" y="0"/>
+          <a:ext cx="0" cy="0"/>
+          <a:chOff x="0" y="0"/>
+          <a:chExt cx="0" cy="0"/>
+        </a:xfrm>
+      </p:grpSpPr>
+      <p:sp>
+        <p:nvSpPr>
+          <p:cNvPr id="2" name="Title 1"/>
+          <p:cNvSpPr>
+            <a:spLocks noGrp="1"/>
+          </p:cNvSpPr>
+          <p:nvPr>
+            <p:ph type="title"/>
+          </p:nvPr>
+        </p:nvSpPr>
+        <p:spPr/>
+        <p:txBody>
+          <a:bodyPr/>
+          <a:lstStyle/>
+          <a:p>
+            <a:r>
+              <a:rPr lang="en-US" dirty="0"/>
+              <a:t>Exact algorithms</a:t>
+            </a:r>
+            <a:endParaRPr lang="pt-PT" dirty="0"/>
+          </a:p>
+        </p:txBody>
+      </p:sp>
+      <p:sp>
+        <p:nvSpPr>
+          <p:cNvPr id="3" name="Content Placeholder 2"/>
+          <p:cNvSpPr>
+            <a:spLocks noGrp="1"/>
+          </p:cNvSpPr>
+          <p:nvPr>
+            <p:ph idx="1"/>
+          </p:nvPr>
+        </p:nvSpPr>
+        <p:spPr/>
+        <p:txBody>
+          <a:bodyPr/>
+          <a:lstStyle/>
+          <a:p>
+            <a:pPr>
+              <a:buFont typeface="Arial" panose="020B0604020202020204" pitchFamily="34" charset="0"/>
+              <a:buChar char="•"/>
+            </a:pPr>
+            <a:r>
+              <a:rPr lang="en-US" dirty="0" smtClean="0"/>
+              <a:t> Search the whole space of solutions;</a:t>
+            </a:r>
+          </a:p>
+          <a:p>
+            <a:pPr>
+              <a:buFont typeface="Arial" panose="020B0604020202020204" pitchFamily="34" charset="0"/>
+              <a:buChar char="•"/>
+            </a:pPr>
+            <a:r>
+              <a:rPr lang="en-US" dirty="0"/>
+              <a:t> </a:t>
+            </a:r>
+            <a:r>
+              <a:rPr lang="en-US" dirty="0" smtClean="0"/>
+              <a:t>It is guaranteed that an optimal solution is found;</a:t>
+            </a:r>
+          </a:p>
+          <a:p>
+            <a:pPr>
+              <a:buFont typeface="Arial" panose="020B0604020202020204" pitchFamily="34" charset="0"/>
+              <a:buChar char="•"/>
+            </a:pPr>
+            <a:r>
+              <a:rPr lang="en-US" dirty="0"/>
+              <a:t> </a:t>
+            </a:r>
+            <a:r>
+              <a:rPr lang="en-US" dirty="0" smtClean="0"/>
+              <a:t>Inappropriate for large sized problem instances;</a:t>
+            </a:r>
+          </a:p>
+          <a:p>
+            <a:pPr>
+              <a:buFont typeface="Arial" panose="020B0604020202020204" pitchFamily="34" charset="0"/>
+              <a:buChar char="•"/>
+            </a:pPr>
+            <a:r>
+              <a:rPr lang="en-US" dirty="0"/>
+              <a:t> </a:t>
+            </a:r>
+            <a:r>
+              <a:rPr lang="en-US" dirty="0" smtClean="0"/>
+              <a:t>Examples of this type of algorithm:</a:t>
+            </a:r>
+          </a:p>
+          <a:p>
+            <a:pPr lvl="1">
+              <a:buFont typeface="Arial" panose="020B0604020202020204" pitchFamily="34" charset="0"/>
+              <a:buChar char="•"/>
+            </a:pPr>
+            <a:r>
+              <a:rPr lang="en-US" dirty="0" smtClean="0"/>
+              <a:t>Branch-and-Bound</a:t>
+            </a:r>
+          </a:p>
+          <a:p>
+            <a:pPr lvl="1">
+              <a:buFont typeface="Arial" panose="020B0604020202020204" pitchFamily="34" charset="0"/>
+              <a:buChar char="•"/>
+            </a:pPr>
+            <a:r>
+              <a:rPr lang="en-US" dirty="0" smtClean="0"/>
+              <a:t>Constraint-Programming</a:t>
+            </a:r>
+          </a:p>
+          <a:p>
+            <a:pPr lvl="1">
+              <a:buFont typeface="Arial" panose="020B0604020202020204" pitchFamily="34" charset="0"/>
+              <a:buChar char="•"/>
+            </a:pPr>
+            <a:r>
+              <a:rPr lang="en-US" dirty="0" smtClean="0"/>
+              <a:t>Integer Programming</a:t>
+            </a:r>
+            <a:endParaRPr lang="en-US" dirty="0"/>
+          </a:p>
+        </p:txBody>
+      </p:sp>
+    </p:spTree>
+    <p:extLst>
+      <p:ext uri="{BB962C8B-B14F-4D97-AF65-F5344CB8AC3E}">
+        <p14:creationId xmlns:p14="http://schemas.microsoft.com/office/powerpoint/2010/main" val="1249698590"/>
+      </p:ext>
+    </p:extLst>
+  </p:cSld>
+  <p:clrMapOvr>
+    <a:masterClrMapping/>
+  </p:clrMapOvr>
+  <p:timing>
+    <p:tnLst>
+      <p:par>
+        <p:cTn id="1" dur="indefinite" restart="never" nodeType="tmRoot"/>
+      </p:par>
+    </p:tnLst>
+  </p:timing>
+</p:sld>
+</file>
+
+<file path=ppt/slides/slide8.xml><?xml version="1.0" encoding="utf-8"?>
+<p:sld xmlns:a="http://schemas.openxmlformats.org/drawingml/2006/main" xmlns:r="http://schemas.openxmlformats.org/officeDocument/2006/relationships" xmlns:p="http://schemas.openxmlformats.org/presentationml/2006/main">
+  <p:cSld>
+    <p:spTree>
+      <p:nvGrpSpPr>
+        <p:cNvPr id="1" name=""/>
+        <p:cNvGrpSpPr/>
+        <p:nvPr/>
+      </p:nvGrpSpPr>
+      <p:grpSpPr>
+        <a:xfrm>
+          <a:off x="0" y="0"/>
+          <a:ext cx="0" cy="0"/>
+          <a:chOff x="0" y="0"/>
+          <a:chExt cx="0" cy="0"/>
+        </a:xfrm>
+      </p:grpSpPr>
+      <p:sp>
+        <p:nvSpPr>
+          <p:cNvPr id="2" name="Title 1"/>
+          <p:cNvSpPr>
+            <a:spLocks noGrp="1"/>
+          </p:cNvSpPr>
+          <p:nvPr>
+            <p:ph type="title"/>
+          </p:nvPr>
+        </p:nvSpPr>
+        <p:spPr/>
+        <p:txBody>
+          <a:bodyPr/>
+          <a:lstStyle/>
+          <a:p>
+            <a:r>
+              <a:rPr lang="en-US" dirty="0"/>
+              <a:t>Graph Coloring Based techniques</a:t>
+            </a:r>
+            <a:endParaRPr lang="pt-PT" dirty="0"/>
+          </a:p>
+        </p:txBody>
+      </p:sp>
+      <p:sp>
+        <p:nvSpPr>
+          <p:cNvPr id="3" name="Content Placeholder 2"/>
+          <p:cNvSpPr>
+            <a:spLocks noGrp="1"/>
+          </p:cNvSpPr>
+          <p:nvPr>
+            <p:ph idx="1"/>
+          </p:nvPr>
+        </p:nvSpPr>
+        <p:spPr/>
+        <p:txBody>
+          <a:bodyPr/>
+          <a:lstStyle/>
+          <a:p>
+            <a:pPr>
+              <a:buFont typeface="Arial" panose="020B0604020202020204" pitchFamily="34" charset="0"/>
+              <a:buChar char="•"/>
+            </a:pPr>
+            <a:r>
+              <a:rPr lang="en-US" dirty="0" smtClean="0"/>
+              <a:t> Assign </a:t>
+            </a:r>
+            <a:r>
+              <a:rPr lang="en-US" dirty="0"/>
+              <a:t>colors to an element type of a graph </a:t>
+            </a:r>
+            <a:r>
+              <a:rPr lang="en-US" dirty="0" smtClean="0"/>
+              <a:t>following certain constraints;</a:t>
+            </a:r>
+          </a:p>
+          <a:p>
+            <a:pPr>
+              <a:buFont typeface="Arial" panose="020B0604020202020204" pitchFamily="34" charset="0"/>
+              <a:buChar char="•"/>
+            </a:pPr>
+            <a:r>
+              <a:rPr lang="en-US" dirty="0"/>
+              <a:t> </a:t>
+            </a:r>
+            <a:r>
+              <a:rPr lang="en-US" dirty="0" smtClean="0"/>
+              <a:t>The quality of the solution is normally measured by the number of colors used to color all the solution;</a:t>
+            </a:r>
+          </a:p>
+          <a:p>
+            <a:pPr>
+              <a:buFont typeface="Arial" panose="020B0604020202020204" pitchFamily="34" charset="0"/>
+              <a:buChar char="•"/>
+            </a:pPr>
+            <a:r>
+              <a:rPr lang="en-US" dirty="0" smtClean="0"/>
+              <a:t> Examples of Graph Coloring problems:</a:t>
+            </a:r>
+          </a:p>
+          <a:p>
+            <a:pPr lvl="1">
+              <a:buFont typeface="Arial" panose="020B0604020202020204" pitchFamily="34" charset="0"/>
+              <a:buChar char="•"/>
+            </a:pPr>
+            <a:r>
+              <a:rPr lang="en-US" dirty="0" smtClean="0"/>
+              <a:t>Vertex Coloring;</a:t>
+            </a:r>
+          </a:p>
+          <a:p>
+            <a:pPr lvl="1">
+              <a:buFont typeface="Arial" panose="020B0604020202020204" pitchFamily="34" charset="0"/>
+              <a:buChar char="•"/>
+            </a:pPr>
+            <a:r>
+              <a:rPr lang="en-US" dirty="0" smtClean="0"/>
+              <a:t>Edge Coloring;</a:t>
+            </a:r>
+            <a:endParaRPr lang="en-US" dirty="0"/>
+          </a:p>
+          <a:p>
+            <a:pPr>
+              <a:buFont typeface="Arial" panose="020B0604020202020204" pitchFamily="34" charset="0"/>
+              <a:buChar char="•"/>
+            </a:pPr>
+            <a:r>
+              <a:rPr lang="en-US" dirty="0"/>
+              <a:t> Timetabling problems can be reduced to a graph coloring problem</a:t>
+            </a:r>
+            <a:r>
+              <a:rPr lang="en-US" dirty="0" smtClean="0"/>
+              <a:t>;</a:t>
+            </a:r>
+            <a:endParaRPr lang="en-US" dirty="0"/>
+          </a:p>
+        </p:txBody>
+      </p:sp>
+    </p:spTree>
+    <p:extLst>
+      <p:ext uri="{BB962C8B-B14F-4D97-AF65-F5344CB8AC3E}">
+        <p14:creationId xmlns:p14="http://schemas.microsoft.com/office/powerpoint/2010/main" val="3183956949"/>
+      </p:ext>
+    </p:extLst>
+  </p:cSld>
+  <p:clrMapOvr>
+    <a:masterClrMapping/>
+  </p:clrMapOvr>
+  <p:timing>
+    <p:tnLst>
+      <p:par>
+        <p:cTn id="1" dur="indefinite" restart="never" nodeType="tmRoot"/>
+      </p:par>
+    </p:tnLst>
+  </p:timing>
+</p:sld>
+</file>
+
+<file path=ppt/slides/slide9.xml><?xml version="1.0" encoding="utf-8"?>
+<p:sld xmlns:a="http://schemas.openxmlformats.org/drawingml/2006/main" xmlns:r="http://schemas.openxmlformats.org/officeDocument/2006/relationships" xmlns:p="http://schemas.openxmlformats.org/presentationml/2006/main">
+  <p:cSld>
+    <p:spTree>
+      <p:nvGrpSpPr>
+        <p:cNvPr id="1" name=""/>
+        <p:cNvGrpSpPr/>
+        <p:nvPr/>
+      </p:nvGrpSpPr>
+      <p:grpSpPr>
+        <a:xfrm>
+          <a:off x="0" y="0"/>
+          <a:ext cx="0" cy="0"/>
+          <a:chOff x="0" y="0"/>
+          <a:chExt cx="0" cy="0"/>
+        </a:xfrm>
+      </p:grpSpPr>
+      <p:sp>
+        <p:nvSpPr>
+          <p:cNvPr id="2" name="Title 1"/>
+          <p:cNvSpPr>
+            <a:spLocks noGrp="1"/>
+          </p:cNvSpPr>
+          <p:nvPr>
+            <p:ph type="title"/>
+          </p:nvPr>
+        </p:nvSpPr>
+        <p:spPr/>
+        <p:txBody>
+          <a:bodyPr/>
+          <a:lstStyle/>
+          <a:p>
+            <a:r>
+              <a:rPr lang="en-US" dirty="0" smtClean="0"/>
+              <a:t>Meta-heuristics</a:t>
+            </a:r>
+            <a:endParaRPr lang="pt-PT" dirty="0"/>
+          </a:p>
+        </p:txBody>
+      </p:sp>
+      <p:sp>
+        <p:nvSpPr>
+          <p:cNvPr id="3" name="Content Placeholder 2"/>
+          <p:cNvSpPr>
+            <a:spLocks noGrp="1"/>
+          </p:cNvSpPr>
+          <p:nvPr>
+            <p:ph idx="1"/>
+          </p:nvPr>
+        </p:nvSpPr>
+        <p:spPr>
+          <a:xfrm>
+            <a:off x="1097280" y="1845734"/>
+            <a:ext cx="10058400" cy="4023360"/>
+          </a:xfrm>
+        </p:spPr>
+        <p:txBody>
+          <a:bodyPr/>
+          <a:lstStyle/>
+          <a:p>
+            <a:pPr>
+              <a:buFont typeface="Arial" panose="020B0604020202020204" pitchFamily="34" charset="0"/>
+              <a:buChar char="•"/>
+            </a:pPr>
+            <a:r>
+              <a:rPr lang="en-US" dirty="0" smtClean="0"/>
+              <a:t> Provide solutions for optimization problems;</a:t>
+            </a:r>
+          </a:p>
+          <a:p>
+            <a:pPr>
+              <a:buFont typeface="Arial" panose="020B0604020202020204" pitchFamily="34" charset="0"/>
+              <a:buChar char="•"/>
+            </a:pPr>
+            <a:r>
+              <a:rPr lang="en-US" dirty="0"/>
+              <a:t> </a:t>
+            </a:r>
+            <a:r>
+              <a:rPr lang="en-US" dirty="0" smtClean="0"/>
+              <a:t>In timetabling problems, meta-heuristics are used to optimize feasible solutions provided by heuristics;</a:t>
+            </a:r>
+          </a:p>
+          <a:p>
+            <a:pPr>
+              <a:buFont typeface="Arial" panose="020B0604020202020204" pitchFamily="34" charset="0"/>
+              <a:buChar char="•"/>
+            </a:pPr>
+            <a:r>
+              <a:rPr lang="en-US" dirty="0"/>
+              <a:t> </a:t>
+            </a:r>
+            <a:r>
+              <a:rPr lang="en-US" dirty="0" smtClean="0"/>
+              <a:t>It is divided into two main sub-types:</a:t>
+            </a:r>
+          </a:p>
+          <a:p>
+            <a:pPr lvl="1">
+              <a:buFont typeface="Arial" panose="020B0604020202020204" pitchFamily="34" charset="0"/>
+              <a:buChar char="•"/>
+            </a:pPr>
+            <a:r>
+              <a:rPr lang="en-US" dirty="0" smtClean="0"/>
+              <a:t>Single-solution meta-heuristics;</a:t>
+            </a:r>
+          </a:p>
+          <a:p>
+            <a:pPr lvl="1">
+              <a:buFont typeface="Arial" panose="020B0604020202020204" pitchFamily="34" charset="0"/>
+              <a:buChar char="•"/>
+            </a:pPr>
+            <a:r>
+              <a:rPr lang="en-US" dirty="0" smtClean="0"/>
+              <a:t>Population-based meta-heuristics.</a:t>
+            </a:r>
+            <a:endParaRPr lang="en-US" dirty="0"/>
+          </a:p>
+        </p:txBody>
+      </p:sp>
+    </p:spTree>
+    <p:extLst>
+      <p:ext uri="{BB962C8B-B14F-4D97-AF65-F5344CB8AC3E}">
+        <p14:creationId xmlns:p14="http://schemas.microsoft.com/office/powerpoint/2010/main" val="3986188383"/>
       </p:ext>
     </p:extLst>
   </p:cSld>

</xml_diff>

<commit_message>
Acabada a apresentação oral
</commit_message>
<xml_diff>
--- a/doc/Apresentação Oral/Examination Timetabling Automation using Hybrid Meta-heuristics.pptx
+++ b/doc/Apresentação Oral/Examination Timetabling Automation using Hybrid Meta-heuristics.pptx
@@ -27,6 +27,14 @@
     <p:sldId id="275" r:id="rId21"/>
     <p:sldId id="276" r:id="rId22"/>
     <p:sldId id="277" r:id="rId23"/>
+    <p:sldId id="278" r:id="rId24"/>
+    <p:sldId id="279" r:id="rId25"/>
+    <p:sldId id="282" r:id="rId26"/>
+    <p:sldId id="280" r:id="rId27"/>
+    <p:sldId id="281" r:id="rId28"/>
+    <p:sldId id="283" r:id="rId29"/>
+    <p:sldId id="284" r:id="rId30"/>
+    <p:sldId id="285" r:id="rId31"/>
   </p:sldIdLst>
   <p:sldSz cx="12192000" cy="6858000"/>
   <p:notesSz cx="6858000" cy="9144000"/>
@@ -359,7 +367,7 @@
           <a:p>
             <a:fld id="{96DFF08F-DC6B-4601-B491-B0F83F6DD2DA}" type="datetimeFigureOut">
               <a:rPr lang="en-US" dirty="0"/>
-              <a:t>13-Jul-15</a:t>
+              <a:t>14-Jul-15</a:t>
             </a:fld>
             <a:endParaRPr lang="en-US" dirty="0"/>
           </a:p>
@@ -562,7 +570,7 @@
           <a:p>
             <a:fld id="{96DFF08F-DC6B-4601-B491-B0F83F6DD2DA}" type="datetimeFigureOut">
               <a:rPr lang="en-US" dirty="0"/>
-              <a:t>13-Jul-15</a:t>
+              <a:t>14-Jul-15</a:t>
             </a:fld>
             <a:endParaRPr lang="en-US" dirty="0"/>
           </a:p>
@@ -813,7 +821,7 @@
           <a:p>
             <a:fld id="{96DFF08F-DC6B-4601-B491-B0F83F6DD2DA}" type="datetimeFigureOut">
               <a:rPr lang="en-US" dirty="0"/>
-              <a:t>13-Jul-15</a:t>
+              <a:t>14-Jul-15</a:t>
             </a:fld>
             <a:endParaRPr lang="en-US" dirty="0"/>
           </a:p>
@@ -978,7 +986,7 @@
           <a:p>
             <a:fld id="{D62CEF3B-A037-46D0-B02C-1428F07E9383}" type="datetimeFigureOut">
               <a:rPr lang="en-US" dirty="0"/>
-              <a:t>13-Jul-15</a:t>
+              <a:t>14-Jul-15</a:t>
             </a:fld>
             <a:endParaRPr lang="en-US" dirty="0"/>
           </a:p>
@@ -1316,7 +1324,7 @@
           <a:p>
             <a:fld id="{96DFF08F-DC6B-4601-B491-B0F83F6DD2DA}" type="datetimeFigureOut">
               <a:rPr lang="en-US" dirty="0"/>
-              <a:t>13-Jul-15</a:t>
+              <a:t>14-Jul-15</a:t>
             </a:fld>
             <a:endParaRPr lang="en-US" dirty="0"/>
           </a:p>
@@ -1586,7 +1594,7 @@
           <a:p>
             <a:fld id="{96DFF08F-DC6B-4601-B491-B0F83F6DD2DA}" type="datetimeFigureOut">
               <a:rPr lang="en-US" dirty="0"/>
-              <a:t>13-Jul-15</a:t>
+              <a:t>14-Jul-15</a:t>
             </a:fld>
             <a:endParaRPr lang="en-US" dirty="0"/>
           </a:p>
@@ -1960,7 +1968,7 @@
           <a:p>
             <a:fld id="{96DFF08F-DC6B-4601-B491-B0F83F6DD2DA}" type="datetimeFigureOut">
               <a:rPr lang="en-US" dirty="0"/>
-              <a:t>13-Jul-15</a:t>
+              <a:t>14-Jul-15</a:t>
             </a:fld>
             <a:endParaRPr lang="en-US" dirty="0"/>
           </a:p>
@@ -2073,7 +2081,7 @@
           <a:p>
             <a:fld id="{96DFF08F-DC6B-4601-B491-B0F83F6DD2DA}" type="datetimeFigureOut">
               <a:rPr lang="en-US" dirty="0"/>
-              <a:t>13-Jul-15</a:t>
+              <a:t>14-Jul-15</a:t>
             </a:fld>
             <a:endParaRPr lang="en-US" dirty="0"/>
           </a:p>
@@ -2240,7 +2248,7 @@
             <a:fld id="{96DFF08F-DC6B-4601-B491-B0F83F6DD2DA}" type="datetimeFigureOut">
               <a:rPr lang="en-US" dirty="0"/>
               <a:pPr/>
-              <a:t>13-Jul-15</a:t>
+              <a:t>14-Jul-15</a:t>
             </a:fld>
             <a:endParaRPr lang="en-US" dirty="0"/>
           </a:p>
@@ -2591,7 +2599,7 @@
             <a:fld id="{96DFF08F-DC6B-4601-B491-B0F83F6DD2DA}" type="datetimeFigureOut">
               <a:rPr lang="en-US" dirty="0"/>
               <a:pPr/>
-              <a:t>13-Jul-15</a:t>
+              <a:t>14-Jul-15</a:t>
             </a:fld>
             <a:endParaRPr lang="en-US" dirty="0"/>
           </a:p>
@@ -2964,7 +2972,7 @@
           <a:p>
             <a:fld id="{96DFF08F-DC6B-4601-B491-B0F83F6DD2DA}" type="datetimeFigureOut">
               <a:rPr lang="en-US" dirty="0"/>
-              <a:t>13-Jul-15</a:t>
+              <a:t>14-Jul-15</a:t>
             </a:fld>
             <a:endParaRPr lang="en-US" dirty="0"/>
           </a:p>
@@ -3247,7 +3255,7 @@
             <a:fld id="{96DFF08F-DC6B-4601-B491-B0F83F6DD2DA}" type="datetimeFigureOut">
               <a:rPr lang="en-US" dirty="0"/>
               <a:pPr/>
-              <a:t>13-Jul-15</a:t>
+              <a:t>14-Jul-15</a:t>
             </a:fld>
             <a:endParaRPr lang="en-US" dirty="0"/>
           </a:p>
@@ -4318,6 +4326,13 @@
   <p:clrMapOvr>
     <a:masterClrMapping/>
   </p:clrMapOvr>
+  <p:timing>
+    <p:tnLst>
+      <p:par>
+        <p:cTn id="1" dur="indefinite" restart="never" nodeType="tmRoot"/>
+      </p:par>
+    </p:tnLst>
+  </p:timing>
 </p:sld>
 </file>
 
@@ -4699,6 +4714,13 @@
   <p:clrMapOvr>
     <a:masterClrMapping/>
   </p:clrMapOvr>
+  <p:timing>
+    <p:tnLst>
+      <p:par>
+        <p:cTn id="1" dur="indefinite" restart="never" nodeType="tmRoot"/>
+      </p:par>
+    </p:tnLst>
+  </p:timing>
 </p:sld>
 </file>
 
@@ -5141,6 +5163,13 @@
   <p:clrMapOvr>
     <a:masterClrMapping/>
   </p:clrMapOvr>
+  <p:timing>
+    <p:tnLst>
+      <p:par>
+        <p:cTn id="1" dur="indefinite" restart="never" nodeType="tmRoot"/>
+      </p:par>
+    </p:tnLst>
+  </p:timing>
 </p:sld>
 </file>
 
@@ -5456,7 +5485,7 @@
         <p:spPr/>
         <p:txBody>
           <a:bodyPr>
-            <a:normAutofit fontScale="70000" lnSpcReduction="20000"/>
+            <a:normAutofit fontScale="62500" lnSpcReduction="20000"/>
           </a:bodyPr>
           <a:lstStyle/>
           <a:p>
@@ -5540,11 +5569,7 @@
             </a:pPr>
             <a:r>
               <a:rPr lang="en-US" dirty="0" smtClean="0"/>
-              <a:t> Loader e solution </a:t>
-            </a:r>
-            <a:r>
-              <a:rPr lang="en-US" dirty="0" smtClean="0"/>
-              <a:t>initialization</a:t>
+              <a:t> Loader e solution initialization</a:t>
             </a:r>
           </a:p>
           <a:p>
@@ -5556,47 +5581,61 @@
               <a:rPr lang="en-US" dirty="0" smtClean="0"/>
               <a:t>Loader</a:t>
             </a:r>
+          </a:p>
+          <a:p>
+            <a:pPr lvl="1">
+              <a:buFont typeface="Arial" panose="020B0604020202020204" pitchFamily="34" charset="0"/>
+              <a:buChar char="•"/>
+            </a:pPr>
+            <a:r>
+              <a:rPr lang="en-US" dirty="0" smtClean="0"/>
+              <a:t>Graph Coloring</a:t>
+            </a:r>
+          </a:p>
+          <a:p>
+            <a:pPr>
+              <a:buFont typeface="Arial" panose="020B0604020202020204" pitchFamily="34" charset="0"/>
+              <a:buChar char="•"/>
+            </a:pPr>
+            <a:r>
+              <a:rPr lang="en-US" dirty="0" smtClean="0"/>
+              <a:t> Proposed approach: Local Search</a:t>
+            </a:r>
+          </a:p>
+          <a:p>
+            <a:pPr lvl="1">
+              <a:buFont typeface="Arial" panose="020B0604020202020204" pitchFamily="34" charset="0"/>
+              <a:buChar char="•"/>
+            </a:pPr>
+            <a:r>
+              <a:rPr lang="en-US" dirty="0" smtClean="0"/>
+              <a:t>Simulated Annealing</a:t>
+            </a:r>
+          </a:p>
+          <a:p>
+            <a:pPr lvl="1">
+              <a:buFont typeface="Arial" panose="020B0604020202020204" pitchFamily="34" charset="0"/>
+              <a:buChar char="•"/>
+            </a:pPr>
+            <a:r>
+              <a:rPr lang="en-US" dirty="0" smtClean="0"/>
+              <a:t>Hill </a:t>
+            </a:r>
+            <a:r>
+              <a:rPr lang="en-US" dirty="0" smtClean="0"/>
+              <a:t>Climbing</a:t>
+            </a:r>
+          </a:p>
+          <a:p>
+            <a:pPr lvl="1">
+              <a:buFont typeface="Arial" panose="020B0604020202020204" pitchFamily="34" charset="0"/>
+              <a:buChar char="•"/>
+            </a:pPr>
+            <a:r>
+              <a:rPr lang="en-US" dirty="0" smtClean="0"/>
+              <a:t>Neighborhood Operators</a:t>
+            </a:r>
             <a:endParaRPr lang="en-US" dirty="0" smtClean="0"/>
-          </a:p>
-          <a:p>
-            <a:pPr lvl="1">
-              <a:buFont typeface="Arial" panose="020B0604020202020204" pitchFamily="34" charset="0"/>
-              <a:buChar char="•"/>
-            </a:pPr>
-            <a:r>
-              <a:rPr lang="en-US" dirty="0" smtClean="0"/>
-              <a:t>Graph Coloring</a:t>
-            </a:r>
-          </a:p>
-          <a:p>
-            <a:pPr>
-              <a:buFont typeface="Arial" panose="020B0604020202020204" pitchFamily="34" charset="0"/>
-              <a:buChar char="•"/>
-            </a:pPr>
-            <a:r>
-              <a:rPr lang="en-US" dirty="0" smtClean="0"/>
-              <a:t> Proposed approach: Local Search</a:t>
-            </a:r>
-          </a:p>
-          <a:p>
-            <a:pPr lvl="1">
-              <a:buFont typeface="Arial" panose="020B0604020202020204" pitchFamily="34" charset="0"/>
-              <a:buChar char="•"/>
-            </a:pPr>
-            <a:r>
-              <a:rPr lang="en-US" dirty="0" smtClean="0"/>
-              <a:t>Simulated Annealing</a:t>
-            </a:r>
-          </a:p>
-          <a:p>
-            <a:pPr lvl="1">
-              <a:buFont typeface="Arial" panose="020B0604020202020204" pitchFamily="34" charset="0"/>
-              <a:buChar char="•"/>
-            </a:pPr>
-            <a:r>
-              <a:rPr lang="en-US" dirty="0" smtClean="0"/>
-              <a:t>Hill Climbing</a:t>
-            </a:r>
           </a:p>
           <a:p>
             <a:pPr>
@@ -6016,13 +6055,8 @@
             </a:pPr>
             <a:r>
               <a:rPr lang="en-US" dirty="0" smtClean="0"/>
-              <a:t>The implementation was divided in </a:t>
-            </a:r>
-            <a:r>
-              <a:rPr lang="en-US" smtClean="0"/>
-              <a:t>four phases:</a:t>
-            </a:r>
-            <a:endParaRPr lang="en-US" dirty="0" smtClean="0"/>
+              <a:t>The implementation was divided in four phases:</a:t>
+            </a:r>
           </a:p>
           <a:p>
             <a:pPr lvl="1">
@@ -6183,16 +6217,8 @@
               <a:buChar char="•"/>
             </a:pPr>
             <a:r>
-              <a:rPr lang="pt-PT" dirty="0"/>
-              <a:t>Normal </a:t>
-            </a:r>
-            <a:r>
-              <a:rPr lang="pt-PT" dirty="0" err="1" smtClean="0"/>
-              <a:t>assignment</a:t>
-            </a:r>
-            <a:r>
-              <a:rPr lang="pt-PT" dirty="0" smtClean="0"/>
-              <a:t>;</a:t>
+              <a:rPr lang="en-US" dirty="0" smtClean="0"/>
+              <a:t>Normal assignment;</a:t>
             </a:r>
           </a:p>
           <a:p>
@@ -6201,16 +6227,8 @@
               <a:buChar char="•"/>
             </a:pPr>
             <a:r>
-              <a:rPr lang="pt-PT" dirty="0"/>
-              <a:t>Forcing </a:t>
-            </a:r>
-            <a:r>
-              <a:rPr lang="pt-PT" dirty="0" err="1" smtClean="0"/>
-              <a:t>assignment</a:t>
-            </a:r>
-            <a:r>
-              <a:rPr lang="pt-PT" dirty="0" smtClean="0"/>
-              <a:t>.</a:t>
+              <a:rPr lang="en-US" dirty="0" smtClean="0"/>
+              <a:t>Forcing assignment.</a:t>
             </a:r>
             <a:endParaRPr lang="en-US" dirty="0"/>
           </a:p>
@@ -6220,6 +6238,1112 @@
     <p:extLst>
       <p:ext uri="{BB962C8B-B14F-4D97-AF65-F5344CB8AC3E}">
         <p14:creationId xmlns:p14="http://schemas.microsoft.com/office/powerpoint/2010/main" val="1055129222"/>
+      </p:ext>
+    </p:extLst>
+  </p:cSld>
+  <p:clrMapOvr>
+    <a:masterClrMapping/>
+  </p:clrMapOvr>
+  <p:timing>
+    <p:tnLst>
+      <p:par>
+        <p:cTn id="1" dur="indefinite" restart="never" nodeType="tmRoot"/>
+      </p:par>
+    </p:tnLst>
+  </p:timing>
+</p:sld>
+</file>
+
+<file path=ppt/slides/slide23.xml><?xml version="1.0" encoding="utf-8"?>
+<p:sld xmlns:a="http://schemas.openxmlformats.org/drawingml/2006/main" xmlns:r="http://schemas.openxmlformats.org/officeDocument/2006/relationships" xmlns:p="http://schemas.openxmlformats.org/presentationml/2006/main">
+  <p:cSld>
+    <p:spTree>
+      <p:nvGrpSpPr>
+        <p:cNvPr id="1" name=""/>
+        <p:cNvGrpSpPr/>
+        <p:nvPr/>
+      </p:nvGrpSpPr>
+      <p:grpSpPr>
+        <a:xfrm>
+          <a:off x="0" y="0"/>
+          <a:ext cx="0" cy="0"/>
+          <a:chOff x="0" y="0"/>
+          <a:chExt cx="0" cy="0"/>
+        </a:xfrm>
+      </p:grpSpPr>
+      <p:sp>
+        <p:nvSpPr>
+          <p:cNvPr id="2" name="Title 1"/>
+          <p:cNvSpPr>
+            <a:spLocks noGrp="1"/>
+          </p:cNvSpPr>
+          <p:nvPr>
+            <p:ph type="title"/>
+          </p:nvPr>
+        </p:nvSpPr>
+        <p:spPr/>
+        <p:txBody>
+          <a:bodyPr/>
+          <a:lstStyle/>
+          <a:p>
+            <a:r>
+              <a:rPr lang="en-US" dirty="0" smtClean="0"/>
+              <a:t>Proposed Approach: Local Search</a:t>
+            </a:r>
+            <a:endParaRPr lang="en-US" dirty="0"/>
+          </a:p>
+        </p:txBody>
+      </p:sp>
+      <p:sp>
+        <p:nvSpPr>
+          <p:cNvPr id="3" name="Content Placeholder 2"/>
+          <p:cNvSpPr>
+            <a:spLocks noGrp="1"/>
+          </p:cNvSpPr>
+          <p:nvPr>
+            <p:ph idx="1"/>
+          </p:nvPr>
+        </p:nvSpPr>
+        <p:spPr/>
+        <p:txBody>
+          <a:bodyPr/>
+          <a:lstStyle/>
+          <a:p>
+            <a:pPr>
+              <a:buFont typeface="Arial" panose="020B0604020202020204" pitchFamily="34" charset="0"/>
+              <a:buChar char="•"/>
+            </a:pPr>
+            <a:r>
+              <a:rPr lang="pt-PT" dirty="0" smtClean="0"/>
+              <a:t> </a:t>
+            </a:r>
+            <a:r>
+              <a:rPr lang="en-US" dirty="0" smtClean="0"/>
+              <a:t>Used to improve the solution obtained using the GC heuristic</a:t>
+            </a:r>
+            <a:r>
+              <a:rPr lang="pt-PT" dirty="0" smtClean="0"/>
+              <a:t>;</a:t>
+            </a:r>
+          </a:p>
+          <a:p>
+            <a:pPr>
+              <a:buFont typeface="Arial" panose="020B0604020202020204" pitchFamily="34" charset="0"/>
+              <a:buChar char="•"/>
+            </a:pPr>
+            <a:r>
+              <a:rPr lang="pt-PT" dirty="0"/>
+              <a:t> </a:t>
+            </a:r>
+            <a:r>
+              <a:rPr lang="en-US" dirty="0" smtClean="0"/>
+              <a:t>Used local search meta-heuristics:</a:t>
+            </a:r>
+          </a:p>
+          <a:p>
+            <a:pPr lvl="1">
+              <a:buFont typeface="Arial" panose="020B0604020202020204" pitchFamily="34" charset="0"/>
+              <a:buChar char="•"/>
+            </a:pPr>
+            <a:r>
+              <a:rPr lang="en-US" dirty="0" smtClean="0"/>
+              <a:t>Simulated Annealing;</a:t>
+            </a:r>
+          </a:p>
+          <a:p>
+            <a:pPr lvl="1">
+              <a:buFont typeface="Arial" panose="020B0604020202020204" pitchFamily="34" charset="0"/>
+              <a:buChar char="•"/>
+            </a:pPr>
+            <a:r>
+              <a:rPr lang="en-US" dirty="0" smtClean="0"/>
+              <a:t>Hill Climbing.</a:t>
+            </a:r>
+            <a:endParaRPr lang="en-US" dirty="0"/>
+          </a:p>
+        </p:txBody>
+      </p:sp>
+    </p:spTree>
+    <p:extLst>
+      <p:ext uri="{BB962C8B-B14F-4D97-AF65-F5344CB8AC3E}">
+        <p14:creationId xmlns:p14="http://schemas.microsoft.com/office/powerpoint/2010/main" val="1436934256"/>
+      </p:ext>
+    </p:extLst>
+  </p:cSld>
+  <p:clrMapOvr>
+    <a:masterClrMapping/>
+  </p:clrMapOvr>
+  <p:timing>
+    <p:tnLst>
+      <p:par>
+        <p:cTn id="1" dur="indefinite" restart="never" nodeType="tmRoot"/>
+      </p:par>
+    </p:tnLst>
+  </p:timing>
+</p:sld>
+</file>
+
+<file path=ppt/slides/slide24.xml><?xml version="1.0" encoding="utf-8"?>
+<p:sld xmlns:a="http://schemas.openxmlformats.org/drawingml/2006/main" xmlns:r="http://schemas.openxmlformats.org/officeDocument/2006/relationships" xmlns:p="http://schemas.openxmlformats.org/presentationml/2006/main">
+  <p:cSld>
+    <p:spTree>
+      <p:nvGrpSpPr>
+        <p:cNvPr id="1" name=""/>
+        <p:cNvGrpSpPr/>
+        <p:nvPr/>
+      </p:nvGrpSpPr>
+      <p:grpSpPr>
+        <a:xfrm>
+          <a:off x="0" y="0"/>
+          <a:ext cx="0" cy="0"/>
+          <a:chOff x="0" y="0"/>
+          <a:chExt cx="0" cy="0"/>
+        </a:xfrm>
+      </p:grpSpPr>
+      <p:sp>
+        <p:nvSpPr>
+          <p:cNvPr id="2" name="Title 1"/>
+          <p:cNvSpPr>
+            <a:spLocks noGrp="1"/>
+          </p:cNvSpPr>
+          <p:nvPr>
+            <p:ph type="title"/>
+          </p:nvPr>
+        </p:nvSpPr>
+        <p:spPr/>
+        <p:txBody>
+          <a:bodyPr/>
+          <a:lstStyle/>
+          <a:p>
+            <a:r>
+              <a:rPr lang="en-US" dirty="0" smtClean="0"/>
+              <a:t>Simulated Annealing</a:t>
+            </a:r>
+            <a:endParaRPr lang="en-US" dirty="0"/>
+          </a:p>
+        </p:txBody>
+      </p:sp>
+      <p:sp>
+        <p:nvSpPr>
+          <p:cNvPr id="3" name="Content Placeholder 2"/>
+          <p:cNvSpPr>
+            <a:spLocks noGrp="1"/>
+          </p:cNvSpPr>
+          <p:nvPr>
+            <p:ph idx="1"/>
+          </p:nvPr>
+        </p:nvSpPr>
+        <p:spPr/>
+        <p:txBody>
+          <a:bodyPr/>
+          <a:lstStyle/>
+          <a:p>
+            <a:pPr>
+              <a:buFont typeface="Arial" panose="020B0604020202020204" pitchFamily="34" charset="0"/>
+              <a:buChar char="•"/>
+            </a:pPr>
+            <a:r>
+              <a:rPr lang="en-US" dirty="0" smtClean="0"/>
+              <a:t> Meta-heuristic used to optimize the solution given by the GC heuristic;</a:t>
+            </a:r>
+          </a:p>
+          <a:p>
+            <a:pPr>
+              <a:buFont typeface="Arial" panose="020B0604020202020204" pitchFamily="34" charset="0"/>
+              <a:buChar char="•"/>
+            </a:pPr>
+            <a:r>
+              <a:rPr lang="pt-PT" dirty="0" smtClean="0"/>
+              <a:t> </a:t>
+            </a:r>
+            <a:r>
+              <a:rPr lang="en-US" dirty="0" smtClean="0"/>
+              <a:t>Generates neighbor solutions by applying neighbor operators;</a:t>
+            </a:r>
+          </a:p>
+          <a:p>
+            <a:pPr>
+              <a:buFont typeface="Arial" panose="020B0604020202020204" pitchFamily="34" charset="0"/>
+              <a:buChar char="•"/>
+            </a:pPr>
+            <a:r>
+              <a:rPr lang="en-US" dirty="0"/>
+              <a:t> </a:t>
+            </a:r>
+            <a:r>
+              <a:rPr lang="en-US" dirty="0" smtClean="0"/>
+              <a:t>Neighbor solutions are accepted using an acceptance criterion:</a:t>
+            </a:r>
+          </a:p>
+          <a:p>
+            <a:pPr>
+              <a:buFont typeface="Arial" panose="020B0604020202020204" pitchFamily="34" charset="0"/>
+              <a:buChar char="•"/>
+            </a:pPr>
+            <a:r>
+              <a:rPr lang="en-US" dirty="0"/>
+              <a:t> </a:t>
+            </a:r>
+            <a:r>
+              <a:rPr lang="en-US" dirty="0" smtClean="0"/>
+              <a:t>The current solution uses an exponential </a:t>
+            </a:r>
+            <a:r>
+              <a:rPr lang="en-US" dirty="0"/>
+              <a:t>(decreasing) </a:t>
+            </a:r>
+            <a:r>
+              <a:rPr lang="en-US" dirty="0" smtClean="0"/>
+              <a:t>cooling schedule:</a:t>
+            </a:r>
+          </a:p>
+          <a:p>
+            <a:pPr>
+              <a:buFont typeface="Arial" panose="020B0604020202020204" pitchFamily="34" charset="0"/>
+              <a:buChar char="•"/>
+            </a:pPr>
+            <a:r>
+              <a:rPr lang="en-US" dirty="0"/>
+              <a:t> </a:t>
+            </a:r>
+            <a:r>
+              <a:rPr lang="en-US" dirty="0" smtClean="0"/>
+              <a:t>Parameters used in this meta-heuristic:</a:t>
+            </a:r>
+          </a:p>
+          <a:p>
+            <a:pPr lvl="1">
+              <a:buFont typeface="Arial" panose="020B0604020202020204" pitchFamily="34" charset="0"/>
+              <a:buChar char="•"/>
+            </a:pPr>
+            <a:r>
+              <a:rPr lang="en-US" dirty="0" smtClean="0"/>
+              <a:t>Maximum temperature;</a:t>
+            </a:r>
+          </a:p>
+          <a:p>
+            <a:pPr lvl="1">
+              <a:buFont typeface="Arial" panose="020B0604020202020204" pitchFamily="34" charset="0"/>
+              <a:buChar char="•"/>
+            </a:pPr>
+            <a:r>
+              <a:rPr lang="en-US" dirty="0" smtClean="0"/>
+              <a:t>Minimum temperature;</a:t>
+            </a:r>
+          </a:p>
+          <a:p>
+            <a:pPr lvl="1">
+              <a:buFont typeface="Arial" panose="020B0604020202020204" pitchFamily="34" charset="0"/>
+              <a:buChar char="•"/>
+            </a:pPr>
+            <a:r>
+              <a:rPr lang="en-US" dirty="0" smtClean="0"/>
+              <a:t>Number of iterations per temperature value;</a:t>
+            </a:r>
+          </a:p>
+          <a:p>
+            <a:pPr lvl="1">
+              <a:buFont typeface="Arial" panose="020B0604020202020204" pitchFamily="34" charset="0"/>
+              <a:buChar char="•"/>
+            </a:pPr>
+            <a:r>
+              <a:rPr lang="en-US" dirty="0" smtClean="0"/>
+              <a:t>Temperature decreasing rate;</a:t>
+            </a:r>
+            <a:endParaRPr lang="pt-PT" dirty="0"/>
+          </a:p>
+        </p:txBody>
+      </p:sp>
+      <p:pic>
+        <p:nvPicPr>
+          <p:cNvPr id="5" name="Picture 4"/>
+          <p:cNvPicPr>
+            <a:picLocks noChangeAspect="1"/>
+          </p:cNvPicPr>
+          <p:nvPr/>
+        </p:nvPicPr>
+        <p:blipFill>
+          <a:blip r:embed="rId2">
+            <a:extLst>
+              <a:ext uri="{28A0092B-C50C-407E-A947-70E740481C1C}">
+                <a14:useLocalDpi xmlns:a14="http://schemas.microsoft.com/office/drawing/2010/main" val="0"/>
+              </a:ext>
+            </a:extLst>
+          </a:blip>
+          <a:stretch>
+            <a:fillRect/>
+          </a:stretch>
+        </p:blipFill>
+        <p:spPr>
+          <a:xfrm>
+            <a:off x="7824158" y="2651943"/>
+            <a:ext cx="2853671" cy="443798"/>
+          </a:xfrm>
+          <a:prstGeom prst="rect">
+            <a:avLst/>
+          </a:prstGeom>
+        </p:spPr>
+      </p:pic>
+      <p:pic>
+        <p:nvPicPr>
+          <p:cNvPr id="6" name="Picture 5"/>
+          <p:cNvPicPr>
+            <a:picLocks noChangeAspect="1"/>
+          </p:cNvPicPr>
+          <p:nvPr/>
+        </p:nvPicPr>
+        <p:blipFill>
+          <a:blip r:embed="rId3">
+            <a:extLst>
+              <a:ext uri="{28A0092B-C50C-407E-A947-70E740481C1C}">
+                <a14:useLocalDpi xmlns:a14="http://schemas.microsoft.com/office/drawing/2010/main" val="0"/>
+              </a:ext>
+            </a:extLst>
+          </a:blip>
+          <a:stretch>
+            <a:fillRect/>
+          </a:stretch>
+        </p:blipFill>
+        <p:spPr>
+          <a:xfrm>
+            <a:off x="8668910" y="3186863"/>
+            <a:ext cx="1734547" cy="362526"/>
+          </a:xfrm>
+          <a:prstGeom prst="rect">
+            <a:avLst/>
+          </a:prstGeom>
+        </p:spPr>
+      </p:pic>
+    </p:spTree>
+    <p:extLst>
+      <p:ext uri="{BB962C8B-B14F-4D97-AF65-F5344CB8AC3E}">
+        <p14:creationId xmlns:p14="http://schemas.microsoft.com/office/powerpoint/2010/main" val="3287894058"/>
+      </p:ext>
+    </p:extLst>
+  </p:cSld>
+  <p:clrMapOvr>
+    <a:masterClrMapping/>
+  </p:clrMapOvr>
+  <p:timing>
+    <p:tnLst>
+      <p:par>
+        <p:cTn id="1" dur="indefinite" restart="never" nodeType="tmRoot"/>
+      </p:par>
+    </p:tnLst>
+  </p:timing>
+</p:sld>
+</file>
+
+<file path=ppt/slides/slide25.xml><?xml version="1.0" encoding="utf-8"?>
+<p:sld xmlns:a="http://schemas.openxmlformats.org/drawingml/2006/main" xmlns:r="http://schemas.openxmlformats.org/officeDocument/2006/relationships" xmlns:p="http://schemas.openxmlformats.org/presentationml/2006/main">
+  <p:cSld>
+    <p:spTree>
+      <p:nvGrpSpPr>
+        <p:cNvPr id="1" name=""/>
+        <p:cNvGrpSpPr/>
+        <p:nvPr/>
+      </p:nvGrpSpPr>
+      <p:grpSpPr>
+        <a:xfrm>
+          <a:off x="0" y="0"/>
+          <a:ext cx="0" cy="0"/>
+          <a:chOff x="0" y="0"/>
+          <a:chExt cx="0" cy="0"/>
+        </a:xfrm>
+      </p:grpSpPr>
+      <p:sp>
+        <p:nvSpPr>
+          <p:cNvPr id="2" name="Title 1"/>
+          <p:cNvSpPr>
+            <a:spLocks noGrp="1"/>
+          </p:cNvSpPr>
+          <p:nvPr>
+            <p:ph type="title"/>
+          </p:nvPr>
+        </p:nvSpPr>
+        <p:spPr/>
+        <p:txBody>
+          <a:bodyPr/>
+          <a:lstStyle/>
+          <a:p>
+            <a:r>
+              <a:rPr lang="en-US" dirty="0"/>
+              <a:t>Simulated Annealing</a:t>
+            </a:r>
+          </a:p>
+        </p:txBody>
+      </p:sp>
+      <p:sp>
+        <p:nvSpPr>
+          <p:cNvPr id="3" name="Content Placeholder 2"/>
+          <p:cNvSpPr>
+            <a:spLocks noGrp="1"/>
+          </p:cNvSpPr>
+          <p:nvPr>
+            <p:ph idx="1"/>
+          </p:nvPr>
+        </p:nvSpPr>
+        <p:spPr/>
+        <p:txBody>
+          <a:bodyPr/>
+          <a:lstStyle/>
+          <a:p>
+            <a:r>
+              <a:rPr lang="en-US" dirty="0" smtClean="0"/>
+              <a:t>Parameters : </a:t>
+            </a:r>
+            <a:r>
+              <a:rPr lang="en-US" dirty="0" err="1" smtClean="0"/>
+              <a:t>TMax</a:t>
+            </a:r>
+            <a:r>
+              <a:rPr lang="en-US" dirty="0" smtClean="0"/>
+              <a:t> </a:t>
+            </a:r>
+            <a:r>
+              <a:rPr lang="en-US" dirty="0"/>
+              <a:t>= 45, </a:t>
+            </a:r>
+            <a:r>
+              <a:rPr lang="en-US" dirty="0" err="1"/>
+              <a:t>TMin</a:t>
+            </a:r>
+            <a:r>
+              <a:rPr lang="en-US" dirty="0"/>
+              <a:t> = </a:t>
+            </a:r>
+            <a:r>
+              <a:rPr lang="en-US" i="1" dirty="0" smtClean="0"/>
+              <a:t>e</a:t>
+            </a:r>
+            <a:r>
+              <a:rPr lang="en-US" baseline="30000" dirty="0" smtClean="0"/>
+              <a:t>−18</a:t>
+            </a:r>
+            <a:r>
+              <a:rPr lang="en-US" dirty="0" smtClean="0"/>
+              <a:t>, loops </a:t>
+            </a:r>
+            <a:r>
+              <a:rPr lang="en-US" dirty="0"/>
+              <a:t>= 5 and rate = </a:t>
+            </a:r>
+            <a:r>
+              <a:rPr lang="en-US" dirty="0" smtClean="0"/>
+              <a:t>0.01</a:t>
+            </a:r>
+          </a:p>
+          <a:p>
+            <a:r>
+              <a:rPr lang="en-US" dirty="0" smtClean="0"/>
+              <a:t>Results:</a:t>
+            </a:r>
+          </a:p>
+          <a:p>
+            <a:endParaRPr lang="en-US" dirty="0"/>
+          </a:p>
+        </p:txBody>
+      </p:sp>
+      <p:pic>
+        <p:nvPicPr>
+          <p:cNvPr id="4" name="Picture 3"/>
+          <p:cNvPicPr>
+            <a:picLocks noChangeAspect="1"/>
+          </p:cNvPicPr>
+          <p:nvPr/>
+        </p:nvPicPr>
+        <p:blipFill>
+          <a:blip r:embed="rId2">
+            <a:extLst>
+              <a:ext uri="{28A0092B-C50C-407E-A947-70E740481C1C}">
+                <a14:useLocalDpi xmlns:a14="http://schemas.microsoft.com/office/drawing/2010/main" val="0"/>
+              </a:ext>
+            </a:extLst>
+          </a:blip>
+          <a:stretch>
+            <a:fillRect/>
+          </a:stretch>
+        </p:blipFill>
+        <p:spPr>
+          <a:xfrm>
+            <a:off x="3705224" y="2336926"/>
+            <a:ext cx="4117217" cy="3532168"/>
+          </a:xfrm>
+          <a:prstGeom prst="rect">
+            <a:avLst/>
+          </a:prstGeom>
+        </p:spPr>
+      </p:pic>
+    </p:spTree>
+    <p:extLst>
+      <p:ext uri="{BB962C8B-B14F-4D97-AF65-F5344CB8AC3E}">
+        <p14:creationId xmlns:p14="http://schemas.microsoft.com/office/powerpoint/2010/main" val="2719957991"/>
+      </p:ext>
+    </p:extLst>
+  </p:cSld>
+  <p:clrMapOvr>
+    <a:masterClrMapping/>
+  </p:clrMapOvr>
+  <p:timing>
+    <p:tnLst>
+      <p:par>
+        <p:cTn id="1" dur="indefinite" restart="never" nodeType="tmRoot"/>
+      </p:par>
+    </p:tnLst>
+  </p:timing>
+</p:sld>
+</file>
+
+<file path=ppt/slides/slide26.xml><?xml version="1.0" encoding="utf-8"?>
+<p:sld xmlns:a="http://schemas.openxmlformats.org/drawingml/2006/main" xmlns:r="http://schemas.openxmlformats.org/officeDocument/2006/relationships" xmlns:p="http://schemas.openxmlformats.org/presentationml/2006/main">
+  <p:cSld>
+    <p:spTree>
+      <p:nvGrpSpPr>
+        <p:cNvPr id="1" name=""/>
+        <p:cNvGrpSpPr/>
+        <p:nvPr/>
+      </p:nvGrpSpPr>
+      <p:grpSpPr>
+        <a:xfrm>
+          <a:off x="0" y="0"/>
+          <a:ext cx="0" cy="0"/>
+          <a:chOff x="0" y="0"/>
+          <a:chExt cx="0" cy="0"/>
+        </a:xfrm>
+      </p:grpSpPr>
+      <p:sp>
+        <p:nvSpPr>
+          <p:cNvPr id="2" name="Title 1"/>
+          <p:cNvSpPr>
+            <a:spLocks noGrp="1"/>
+          </p:cNvSpPr>
+          <p:nvPr>
+            <p:ph type="title"/>
+          </p:nvPr>
+        </p:nvSpPr>
+        <p:spPr/>
+        <p:txBody>
+          <a:bodyPr/>
+          <a:lstStyle/>
+          <a:p>
+            <a:r>
+              <a:rPr lang="en-US" dirty="0" smtClean="0"/>
+              <a:t>Hill Climbing</a:t>
+            </a:r>
+            <a:endParaRPr lang="en-US" dirty="0"/>
+          </a:p>
+        </p:txBody>
+      </p:sp>
+      <p:sp>
+        <p:nvSpPr>
+          <p:cNvPr id="3" name="Content Placeholder 2"/>
+          <p:cNvSpPr>
+            <a:spLocks noGrp="1"/>
+          </p:cNvSpPr>
+          <p:nvPr>
+            <p:ph idx="1"/>
+          </p:nvPr>
+        </p:nvSpPr>
+        <p:spPr/>
+        <p:txBody>
+          <a:bodyPr/>
+          <a:lstStyle/>
+          <a:p>
+            <a:pPr>
+              <a:buFont typeface="Arial" panose="020B0604020202020204" pitchFamily="34" charset="0"/>
+              <a:buChar char="•"/>
+            </a:pPr>
+            <a:r>
+              <a:rPr lang="en-US" dirty="0" smtClean="0"/>
+              <a:t> Last meta-heuristic used in the project, after SA;</a:t>
+            </a:r>
+          </a:p>
+          <a:p>
+            <a:pPr>
+              <a:buFont typeface="Arial" panose="020B0604020202020204" pitchFamily="34" charset="0"/>
+              <a:buChar char="•"/>
+            </a:pPr>
+            <a:r>
+              <a:rPr lang="en-US" dirty="0" smtClean="0"/>
+              <a:t> Uses the same neighbor operators as the SA;</a:t>
+            </a:r>
+          </a:p>
+          <a:p>
+            <a:pPr>
+              <a:buFont typeface="Arial" panose="020B0604020202020204" pitchFamily="34" charset="0"/>
+              <a:buChar char="•"/>
+            </a:pPr>
+            <a:r>
+              <a:rPr lang="en-US" dirty="0"/>
+              <a:t> </a:t>
+            </a:r>
+            <a:r>
+              <a:rPr lang="en-US" dirty="0" smtClean="0"/>
+              <a:t>Only accepts better solutions;</a:t>
+            </a:r>
+          </a:p>
+          <a:p>
+            <a:pPr>
+              <a:buFont typeface="Arial" panose="020B0604020202020204" pitchFamily="34" charset="0"/>
+              <a:buChar char="•"/>
+            </a:pPr>
+            <a:r>
+              <a:rPr lang="en-US" dirty="0"/>
+              <a:t> </a:t>
+            </a:r>
+            <a:r>
+              <a:rPr lang="en-US" dirty="0" smtClean="0"/>
+              <a:t>It is time-monitored;</a:t>
+            </a:r>
+          </a:p>
+          <a:p>
+            <a:pPr>
+              <a:buFont typeface="Arial" panose="020B0604020202020204" pitchFamily="34" charset="0"/>
+              <a:buChar char="•"/>
+            </a:pPr>
+            <a:r>
+              <a:rPr lang="en-US" dirty="0"/>
+              <a:t> </a:t>
+            </a:r>
+            <a:r>
+              <a:rPr lang="en-US" dirty="0" smtClean="0"/>
+              <a:t>Used to guarantee that the project is finished within the given time limit (total of 225 seconds);</a:t>
+            </a:r>
+          </a:p>
+        </p:txBody>
+      </p:sp>
+    </p:spTree>
+    <p:extLst>
+      <p:ext uri="{BB962C8B-B14F-4D97-AF65-F5344CB8AC3E}">
+        <p14:creationId xmlns:p14="http://schemas.microsoft.com/office/powerpoint/2010/main" val="347719205"/>
+      </p:ext>
+    </p:extLst>
+  </p:cSld>
+  <p:clrMapOvr>
+    <a:masterClrMapping/>
+  </p:clrMapOvr>
+  <p:timing>
+    <p:tnLst>
+      <p:par>
+        <p:cTn id="1" dur="indefinite" restart="never" nodeType="tmRoot"/>
+      </p:par>
+    </p:tnLst>
+  </p:timing>
+</p:sld>
+</file>
+
+<file path=ppt/slides/slide27.xml><?xml version="1.0" encoding="utf-8"?>
+<p:sld xmlns:a="http://schemas.openxmlformats.org/drawingml/2006/main" xmlns:r="http://schemas.openxmlformats.org/officeDocument/2006/relationships" xmlns:p="http://schemas.openxmlformats.org/presentationml/2006/main">
+  <p:cSld>
+    <p:spTree>
+      <p:nvGrpSpPr>
+        <p:cNvPr id="1" name=""/>
+        <p:cNvGrpSpPr/>
+        <p:nvPr/>
+      </p:nvGrpSpPr>
+      <p:grpSpPr>
+        <a:xfrm>
+          <a:off x="0" y="0"/>
+          <a:ext cx="0" cy="0"/>
+          <a:chOff x="0" y="0"/>
+          <a:chExt cx="0" cy="0"/>
+        </a:xfrm>
+      </p:grpSpPr>
+      <p:sp>
+        <p:nvSpPr>
+          <p:cNvPr id="2" name="Title 1"/>
+          <p:cNvSpPr>
+            <a:spLocks noGrp="1"/>
+          </p:cNvSpPr>
+          <p:nvPr>
+            <p:ph type="title"/>
+          </p:nvPr>
+        </p:nvSpPr>
+        <p:spPr/>
+        <p:txBody>
+          <a:bodyPr/>
+          <a:lstStyle/>
+          <a:p>
+            <a:r>
+              <a:rPr lang="en-US" dirty="0" smtClean="0"/>
+              <a:t>Neighborhood Operators</a:t>
+            </a:r>
+            <a:endParaRPr lang="en-US" dirty="0"/>
+          </a:p>
+        </p:txBody>
+      </p:sp>
+      <p:sp>
+        <p:nvSpPr>
+          <p:cNvPr id="3" name="Content Placeholder 2"/>
+          <p:cNvSpPr>
+            <a:spLocks noGrp="1"/>
+          </p:cNvSpPr>
+          <p:nvPr>
+            <p:ph idx="1"/>
+          </p:nvPr>
+        </p:nvSpPr>
+        <p:spPr/>
+        <p:txBody>
+          <a:bodyPr/>
+          <a:lstStyle/>
+          <a:p>
+            <a:pPr>
+              <a:buFont typeface="Arial" panose="020B0604020202020204" pitchFamily="34" charset="0"/>
+              <a:buChar char="•"/>
+            </a:pPr>
+            <a:r>
+              <a:rPr lang="en-US" dirty="0" smtClean="0"/>
+              <a:t> The neighborhood operators are randomly chosen to be used:</a:t>
+            </a:r>
+          </a:p>
+          <a:p>
+            <a:pPr lvl="1">
+              <a:buFont typeface="Arial" panose="020B0604020202020204" pitchFamily="34" charset="0"/>
+              <a:buChar char="•"/>
+            </a:pPr>
+            <a:r>
+              <a:rPr lang="en-US" dirty="0" smtClean="0"/>
+              <a:t>Room Change;</a:t>
+            </a:r>
+          </a:p>
+          <a:p>
+            <a:pPr lvl="1">
+              <a:buFont typeface="Arial" panose="020B0604020202020204" pitchFamily="34" charset="0"/>
+              <a:buChar char="•"/>
+            </a:pPr>
+            <a:r>
+              <a:rPr lang="en-US" dirty="0" smtClean="0"/>
+              <a:t>Period Change;</a:t>
+            </a:r>
+          </a:p>
+          <a:p>
+            <a:pPr lvl="1">
+              <a:buFont typeface="Arial" panose="020B0604020202020204" pitchFamily="34" charset="0"/>
+              <a:buChar char="•"/>
+            </a:pPr>
+            <a:r>
+              <a:rPr lang="en-US" dirty="0" smtClean="0"/>
+              <a:t>Period &amp; Room Change;</a:t>
+            </a:r>
+          </a:p>
+          <a:p>
+            <a:pPr lvl="1">
+              <a:buFont typeface="Arial" panose="020B0604020202020204" pitchFamily="34" charset="0"/>
+              <a:buChar char="•"/>
+            </a:pPr>
+            <a:r>
+              <a:rPr lang="en-US" dirty="0" smtClean="0"/>
+              <a:t>Room Swap;</a:t>
+            </a:r>
+          </a:p>
+          <a:p>
+            <a:pPr lvl="1">
+              <a:buFont typeface="Arial" panose="020B0604020202020204" pitchFamily="34" charset="0"/>
+              <a:buChar char="•"/>
+            </a:pPr>
+            <a:r>
+              <a:rPr lang="en-US" dirty="0" smtClean="0"/>
+              <a:t>Period Swap;</a:t>
+            </a:r>
+          </a:p>
+          <a:p>
+            <a:pPr lvl="1">
+              <a:buFont typeface="Arial" panose="020B0604020202020204" pitchFamily="34" charset="0"/>
+              <a:buChar char="•"/>
+            </a:pPr>
+            <a:r>
+              <a:rPr lang="en-US" dirty="0" smtClean="0"/>
+              <a:t>Period &amp; Room Swap.</a:t>
+            </a:r>
+            <a:endParaRPr lang="en-US" dirty="0"/>
+          </a:p>
+        </p:txBody>
+      </p:sp>
+    </p:spTree>
+    <p:extLst>
+      <p:ext uri="{BB962C8B-B14F-4D97-AF65-F5344CB8AC3E}">
+        <p14:creationId xmlns:p14="http://schemas.microsoft.com/office/powerpoint/2010/main" val="381101581"/>
+      </p:ext>
+    </p:extLst>
+  </p:cSld>
+  <p:clrMapOvr>
+    <a:masterClrMapping/>
+  </p:clrMapOvr>
+  <p:timing>
+    <p:tnLst>
+      <p:par>
+        <p:cTn id="1" dur="indefinite" restart="never" nodeType="tmRoot"/>
+      </p:par>
+    </p:tnLst>
+  </p:timing>
+</p:sld>
+</file>
+
+<file path=ppt/slides/slide28.xml><?xml version="1.0" encoding="utf-8"?>
+<p:sld xmlns:a="http://schemas.openxmlformats.org/drawingml/2006/main" xmlns:r="http://schemas.openxmlformats.org/officeDocument/2006/relationships" xmlns:p="http://schemas.openxmlformats.org/presentationml/2006/main">
+  <p:cSld>
+    <p:spTree>
+      <p:nvGrpSpPr>
+        <p:cNvPr id="1" name=""/>
+        <p:cNvGrpSpPr/>
+        <p:nvPr/>
+      </p:nvGrpSpPr>
+      <p:grpSpPr>
+        <a:xfrm>
+          <a:off x="0" y="0"/>
+          <a:ext cx="0" cy="0"/>
+          <a:chOff x="0" y="0"/>
+          <a:chExt cx="0" cy="0"/>
+        </a:xfrm>
+      </p:grpSpPr>
+      <p:sp>
+        <p:nvSpPr>
+          <p:cNvPr id="2" name="Title 1"/>
+          <p:cNvSpPr>
+            <a:spLocks noGrp="1"/>
+          </p:cNvSpPr>
+          <p:nvPr>
+            <p:ph type="title"/>
+          </p:nvPr>
+        </p:nvSpPr>
+        <p:spPr/>
+        <p:txBody>
+          <a:bodyPr/>
+          <a:lstStyle/>
+          <a:p>
+            <a:r>
+              <a:rPr lang="en-US" dirty="0" smtClean="0"/>
+              <a:t>Experimental Results</a:t>
+            </a:r>
+            <a:endParaRPr lang="en-US" dirty="0"/>
+          </a:p>
+        </p:txBody>
+      </p:sp>
+      <p:sp>
+        <p:nvSpPr>
+          <p:cNvPr id="3" name="Content Placeholder 2"/>
+          <p:cNvSpPr>
+            <a:spLocks noGrp="1"/>
+          </p:cNvSpPr>
+          <p:nvPr>
+            <p:ph idx="1"/>
+          </p:nvPr>
+        </p:nvSpPr>
+        <p:spPr/>
+        <p:txBody>
+          <a:bodyPr/>
+          <a:lstStyle/>
+          <a:p>
+            <a:pPr>
+              <a:buFont typeface="Arial" panose="020B0604020202020204" pitchFamily="34" charset="0"/>
+              <a:buChar char="•"/>
+            </a:pPr>
+            <a:r>
+              <a:rPr lang="en-US" dirty="0" smtClean="0"/>
+              <a:t> The results were obtained by averaging the 10 runs for each dataset;</a:t>
+            </a:r>
+          </a:p>
+          <a:p>
+            <a:pPr>
+              <a:buFont typeface="Arial" panose="020B0604020202020204" pitchFamily="34" charset="0"/>
+              <a:buChar char="•"/>
+            </a:pPr>
+            <a:r>
+              <a:rPr lang="en-US" dirty="0"/>
+              <a:t> </a:t>
+            </a:r>
+            <a:r>
+              <a:rPr lang="en-US" dirty="0"/>
+              <a:t>The parameters used to run the SA </a:t>
+            </a:r>
+            <a:r>
+              <a:rPr lang="en-US" dirty="0" smtClean="0"/>
+              <a:t>were:</a:t>
+            </a:r>
+          </a:p>
+          <a:p>
+            <a:pPr lvl="1">
+              <a:buFont typeface="Arial" panose="020B0604020202020204" pitchFamily="34" charset="0"/>
+              <a:buChar char="•"/>
+            </a:pPr>
+            <a:r>
+              <a:rPr lang="en-US" dirty="0" err="1" smtClean="0"/>
+              <a:t>TMax</a:t>
+            </a:r>
+            <a:r>
+              <a:rPr lang="en-US" dirty="0" smtClean="0"/>
+              <a:t> </a:t>
+            </a:r>
+            <a:r>
+              <a:rPr lang="en-US" dirty="0"/>
+              <a:t>= </a:t>
+            </a:r>
+            <a:r>
+              <a:rPr lang="en-US" dirty="0" smtClean="0"/>
+              <a:t>0.01</a:t>
+            </a:r>
+          </a:p>
+          <a:p>
+            <a:pPr lvl="1">
+              <a:buFont typeface="Arial" panose="020B0604020202020204" pitchFamily="34" charset="0"/>
+              <a:buChar char="•"/>
+            </a:pPr>
+            <a:r>
+              <a:rPr lang="en-US" dirty="0" err="1" smtClean="0"/>
+              <a:t>TMin</a:t>
+            </a:r>
+            <a:r>
+              <a:rPr lang="en-US" dirty="0" smtClean="0"/>
+              <a:t> </a:t>
+            </a:r>
+            <a:r>
+              <a:rPr lang="en-US" dirty="0"/>
+              <a:t>= </a:t>
+            </a:r>
+            <a:r>
+              <a:rPr lang="en-US" dirty="0" smtClean="0"/>
+              <a:t>1</a:t>
+            </a:r>
+            <a:r>
+              <a:rPr lang="en-US" i="1" dirty="0" smtClean="0"/>
+              <a:t>e</a:t>
+            </a:r>
+            <a:r>
+              <a:rPr lang="en-US" baseline="30000" dirty="0" smtClean="0"/>
+              <a:t>-18</a:t>
+            </a:r>
+          </a:p>
+          <a:p>
+            <a:pPr lvl="1">
+              <a:buFont typeface="Arial" panose="020B0604020202020204" pitchFamily="34" charset="0"/>
+              <a:buChar char="•"/>
+            </a:pPr>
+            <a:r>
+              <a:rPr lang="en-US" dirty="0" smtClean="0"/>
+              <a:t>reps </a:t>
+            </a:r>
+            <a:r>
+              <a:rPr lang="en-US" dirty="0"/>
+              <a:t>= </a:t>
+            </a:r>
+            <a:r>
+              <a:rPr lang="en-US" dirty="0" smtClean="0"/>
+              <a:t>5</a:t>
+            </a:r>
+          </a:p>
+          <a:p>
+            <a:pPr lvl="1">
+              <a:buFont typeface="Arial" panose="020B0604020202020204" pitchFamily="34" charset="0"/>
+              <a:buChar char="•"/>
+            </a:pPr>
+            <a:r>
+              <a:rPr lang="en-US" dirty="0" smtClean="0"/>
+              <a:t>rate </a:t>
+            </a:r>
+            <a:r>
+              <a:rPr lang="en-US" dirty="0"/>
+              <a:t>= </a:t>
+            </a:r>
+            <a:r>
+              <a:rPr lang="en-US" dirty="0" smtClean="0"/>
+              <a:t>0.001</a:t>
+            </a:r>
+            <a:endParaRPr lang="en-US" dirty="0"/>
+          </a:p>
+        </p:txBody>
+      </p:sp>
+    </p:spTree>
+    <p:extLst>
+      <p:ext uri="{BB962C8B-B14F-4D97-AF65-F5344CB8AC3E}">
+        <p14:creationId xmlns:p14="http://schemas.microsoft.com/office/powerpoint/2010/main" val="638605249"/>
+      </p:ext>
+    </p:extLst>
+  </p:cSld>
+  <p:clrMapOvr>
+    <a:masterClrMapping/>
+  </p:clrMapOvr>
+  <p:timing>
+    <p:tnLst>
+      <p:par>
+        <p:cTn id="1" dur="indefinite" restart="never" nodeType="tmRoot"/>
+      </p:par>
+    </p:tnLst>
+  </p:timing>
+</p:sld>
+</file>
+
+<file path=ppt/slides/slide29.xml><?xml version="1.0" encoding="utf-8"?>
+<p:sld xmlns:a="http://schemas.openxmlformats.org/drawingml/2006/main" xmlns:r="http://schemas.openxmlformats.org/officeDocument/2006/relationships" xmlns:p="http://schemas.openxmlformats.org/presentationml/2006/main">
+  <p:cSld>
+    <p:spTree>
+      <p:nvGrpSpPr>
+        <p:cNvPr id="1" name=""/>
+        <p:cNvGrpSpPr/>
+        <p:nvPr/>
+      </p:nvGrpSpPr>
+      <p:grpSpPr>
+        <a:xfrm>
+          <a:off x="0" y="0"/>
+          <a:ext cx="0" cy="0"/>
+          <a:chOff x="0" y="0"/>
+          <a:chExt cx="0" cy="0"/>
+        </a:xfrm>
+      </p:grpSpPr>
+      <p:sp>
+        <p:nvSpPr>
+          <p:cNvPr id="2" name="Title 1"/>
+          <p:cNvSpPr>
+            <a:spLocks noGrp="1"/>
+          </p:cNvSpPr>
+          <p:nvPr>
+            <p:ph type="title"/>
+          </p:nvPr>
+        </p:nvSpPr>
+        <p:spPr/>
+        <p:txBody>
+          <a:bodyPr/>
+          <a:lstStyle/>
+          <a:p>
+            <a:r>
+              <a:rPr lang="en-US" dirty="0"/>
+              <a:t>Experimental Results</a:t>
+            </a:r>
+          </a:p>
+        </p:txBody>
+      </p:sp>
+      <p:pic>
+        <p:nvPicPr>
+          <p:cNvPr id="4" name="Content Placeholder 3"/>
+          <p:cNvPicPr>
+            <a:picLocks noGrp="1" noChangeAspect="1"/>
+          </p:cNvPicPr>
+          <p:nvPr>
+            <p:ph idx="1"/>
+          </p:nvPr>
+        </p:nvPicPr>
+        <p:blipFill>
+          <a:blip r:embed="rId2">
+            <a:extLst>
+              <a:ext uri="{28A0092B-C50C-407E-A947-70E740481C1C}">
+                <a14:useLocalDpi xmlns:a14="http://schemas.microsoft.com/office/drawing/2010/main" val="0"/>
+              </a:ext>
+            </a:extLst>
+          </a:blip>
+          <a:stretch>
+            <a:fillRect/>
+          </a:stretch>
+        </p:blipFill>
+        <p:spPr>
+          <a:xfrm>
+            <a:off x="2283197" y="1846263"/>
+            <a:ext cx="7685931" cy="4022725"/>
+          </a:xfrm>
+        </p:spPr>
+      </p:pic>
+    </p:spTree>
+    <p:extLst>
+      <p:ext uri="{BB962C8B-B14F-4D97-AF65-F5344CB8AC3E}">
+        <p14:creationId xmlns:p14="http://schemas.microsoft.com/office/powerpoint/2010/main" val="1011109935"/>
       </p:ext>
     </p:extLst>
   </p:cSld>
@@ -6292,12 +7416,6 @@
           <a:lstStyle/>
           <a:p>
             <a:pPr marL="91440" lvl="1" indent="-91440">
-              <a:spcBef>
-                <a:spcPts val="1200"/>
-              </a:spcBef>
-              <a:spcAft>
-                <a:spcPts val="200"/>
-              </a:spcAft>
               <a:buSzPct val="100000"/>
               <a:buFont typeface="Calibri" panose="020F0502020204030204" pitchFamily="34" charset="0"/>
               <a:buChar char=" "/>
@@ -6320,53 +7438,35 @@
             </a:r>
           </a:p>
           <a:p>
-            <a:pPr marL="285750" lvl="1" indent="-285750">
-              <a:spcBef>
-                <a:spcPts val="1200"/>
-              </a:spcBef>
-              <a:spcAft>
-                <a:spcPts val="200"/>
-              </a:spcAft>
+            <a:pPr marL="468630" lvl="2" indent="-285750">
               <a:buSzPct val="100000"/>
               <a:buFont typeface="Arial" panose="020B0604020202020204" pitchFamily="34" charset="0"/>
               <a:buChar char="•"/>
             </a:pPr>
             <a:r>
-              <a:rPr lang="en-US" dirty="0" smtClean="0"/>
+              <a:rPr lang="en-US" sz="1800" dirty="0" smtClean="0"/>
               <a:t>Examination Timetabling;</a:t>
             </a:r>
           </a:p>
           <a:p>
-            <a:pPr marL="285750" lvl="1" indent="-285750">
-              <a:spcBef>
-                <a:spcPts val="1200"/>
-              </a:spcBef>
-              <a:spcAft>
-                <a:spcPts val="200"/>
-              </a:spcAft>
+            <a:pPr marL="468630" lvl="2" indent="-285750">
               <a:buSzPct val="100000"/>
               <a:buFont typeface="Arial" panose="020B0604020202020204" pitchFamily="34" charset="0"/>
               <a:buChar char="•"/>
             </a:pPr>
             <a:r>
-              <a:rPr lang="en-US" dirty="0" smtClean="0"/>
+              <a:rPr lang="en-US" sz="1800" dirty="0" smtClean="0"/>
               <a:t>Course Timetabling;</a:t>
             </a:r>
           </a:p>
           <a:p>
-            <a:pPr marL="285750" lvl="1" indent="-285750">
-              <a:spcBef>
-                <a:spcPts val="1200"/>
-              </a:spcBef>
-              <a:spcAft>
-                <a:spcPts val="200"/>
-              </a:spcAft>
+            <a:pPr marL="468630" lvl="2" indent="-285750">
               <a:buSzPct val="100000"/>
               <a:buFont typeface="Arial" panose="020B0604020202020204" pitchFamily="34" charset="0"/>
               <a:buChar char="•"/>
             </a:pPr>
             <a:r>
-              <a:rPr lang="en-US" dirty="0" smtClean="0"/>
+              <a:rPr lang="en-US" sz="1800" dirty="0" smtClean="0"/>
               <a:t>School Timetabling.</a:t>
             </a:r>
           </a:p>
@@ -6385,12 +7485,6 @@
           </a:p>
           <a:p>
             <a:pPr marL="0" lvl="1" indent="0">
-              <a:spcBef>
-                <a:spcPts val="1200"/>
-              </a:spcBef>
-              <a:spcAft>
-                <a:spcPts val="200"/>
-              </a:spcAft>
               <a:buSzPct val="100000"/>
               <a:buNone/>
             </a:pPr>
@@ -6400,39 +7494,27 @@
             </a:r>
           </a:p>
           <a:p>
-            <a:pPr marL="285750" lvl="1" indent="-285750">
-              <a:spcBef>
-                <a:spcPts val="1200"/>
-              </a:spcBef>
-              <a:spcAft>
-                <a:spcPts val="200"/>
-              </a:spcAft>
+            <a:pPr marL="468630" lvl="2" indent="-285750">
               <a:buSzPct val="100000"/>
               <a:buFont typeface="Arial" panose="020B0604020202020204" pitchFamily="34" charset="0"/>
               <a:buChar char="•"/>
             </a:pPr>
             <a:r>
-              <a:rPr lang="en-US" dirty="0" smtClean="0"/>
+              <a:rPr lang="en-US" sz="1800" dirty="0" smtClean="0"/>
               <a:t>Hard constraints;</a:t>
             </a:r>
           </a:p>
           <a:p>
-            <a:pPr marL="285750" lvl="1" indent="-285750">
-              <a:spcBef>
-                <a:spcPts val="1200"/>
-              </a:spcBef>
-              <a:spcAft>
-                <a:spcPts val="200"/>
-              </a:spcAft>
+            <a:pPr marL="468630" lvl="2" indent="-285750">
               <a:buSzPct val="100000"/>
               <a:buFont typeface="Arial" panose="020B0604020202020204" pitchFamily="34" charset="0"/>
               <a:buChar char="•"/>
             </a:pPr>
             <a:r>
-              <a:rPr lang="en-US" dirty="0" smtClean="0"/>
+              <a:rPr lang="en-US" sz="1800" dirty="0" smtClean="0"/>
               <a:t>Soft constraints.</a:t>
             </a:r>
-            <a:endParaRPr lang="en-US" dirty="0"/>
+            <a:endParaRPr lang="en-US" sz="1800" dirty="0"/>
           </a:p>
         </p:txBody>
       </p:sp>
@@ -6440,6 +7522,99 @@
     <p:extLst>
       <p:ext uri="{BB962C8B-B14F-4D97-AF65-F5344CB8AC3E}">
         <p14:creationId xmlns:p14="http://schemas.microsoft.com/office/powerpoint/2010/main" val="1585950118"/>
+      </p:ext>
+    </p:extLst>
+  </p:cSld>
+  <p:clrMapOvr>
+    <a:masterClrMapping/>
+  </p:clrMapOvr>
+  <p:timing>
+    <p:tnLst>
+      <p:par>
+        <p:cTn id="1" dur="indefinite" restart="never" nodeType="tmRoot"/>
+      </p:par>
+    </p:tnLst>
+  </p:timing>
+</p:sld>
+</file>
+
+<file path=ppt/slides/slide30.xml><?xml version="1.0" encoding="utf-8"?>
+<p:sld xmlns:a="http://schemas.openxmlformats.org/drawingml/2006/main" xmlns:r="http://schemas.openxmlformats.org/officeDocument/2006/relationships" xmlns:p="http://schemas.openxmlformats.org/presentationml/2006/main">
+  <p:cSld>
+    <p:spTree>
+      <p:nvGrpSpPr>
+        <p:cNvPr id="1" name=""/>
+        <p:cNvGrpSpPr/>
+        <p:nvPr/>
+      </p:nvGrpSpPr>
+      <p:grpSpPr>
+        <a:xfrm>
+          <a:off x="0" y="0"/>
+          <a:ext cx="0" cy="0"/>
+          <a:chOff x="0" y="0"/>
+          <a:chExt cx="0" cy="0"/>
+        </a:xfrm>
+      </p:grpSpPr>
+      <p:sp>
+        <p:nvSpPr>
+          <p:cNvPr id="2" name="Title 1"/>
+          <p:cNvSpPr>
+            <a:spLocks noGrp="1"/>
+          </p:cNvSpPr>
+          <p:nvPr>
+            <p:ph type="title"/>
+          </p:nvPr>
+        </p:nvSpPr>
+        <p:spPr/>
+        <p:txBody>
+          <a:bodyPr/>
+          <a:lstStyle/>
+          <a:p>
+            <a:pPr algn="ctr"/>
+            <a:r>
+              <a:rPr lang="en-US" dirty="0" smtClean="0"/>
+              <a:t>The End</a:t>
+            </a:r>
+            <a:endParaRPr lang="en-US" dirty="0"/>
+          </a:p>
+        </p:txBody>
+      </p:sp>
+      <p:sp>
+        <p:nvSpPr>
+          <p:cNvPr id="3" name="Content Placeholder 2"/>
+          <p:cNvSpPr>
+            <a:spLocks noGrp="1"/>
+          </p:cNvSpPr>
+          <p:nvPr>
+            <p:ph idx="1"/>
+          </p:nvPr>
+        </p:nvSpPr>
+        <p:spPr/>
+        <p:txBody>
+          <a:bodyPr/>
+          <a:lstStyle/>
+          <a:p>
+            <a:pPr algn="ctr"/>
+            <a:endParaRPr lang="en-US" dirty="0" smtClean="0"/>
+          </a:p>
+          <a:p>
+            <a:pPr algn="ctr"/>
+            <a:endParaRPr lang="en-US" dirty="0"/>
+          </a:p>
+          <a:p>
+            <a:pPr algn="ctr"/>
+            <a:r>
+              <a:rPr lang="en-US" dirty="0" smtClean="0"/>
+              <a:t>I hope you enjoyed it!</a:t>
+            </a:r>
+            <a:endParaRPr lang="en-US" dirty="0"/>
+          </a:p>
+        </p:txBody>
+      </p:sp>
+    </p:spTree>
+    <p:extLst>
+      <p:ext uri="{BB962C8B-B14F-4D97-AF65-F5344CB8AC3E}">
+        <p14:creationId xmlns:p14="http://schemas.microsoft.com/office/powerpoint/2010/main" val="4245037988"/>
       </p:ext>
     </p:extLst>
   </p:cSld>
@@ -6511,13 +7686,21 @@
           <a:bodyPr/>
           <a:lstStyle/>
           <a:p>
+            <a:pPr>
+              <a:spcBef>
+                <a:spcPts val="200"/>
+              </a:spcBef>
+              <a:spcAft>
+                <a:spcPts val="400"/>
+              </a:spcAft>
+            </a:pPr>
             <a:r>
               <a:rPr lang="en-US" dirty="0" smtClean="0"/>
               <a:t>The main objectives of this project are:</a:t>
             </a:r>
           </a:p>
           <a:p>
-            <a:pPr>
+            <a:pPr lvl="1">
               <a:buFont typeface="Arial" panose="020B0604020202020204" pitchFamily="34" charset="0"/>
               <a:buChar char="•"/>
             </a:pPr>
@@ -6531,11 +7714,16 @@
             </a:r>
             <a:r>
               <a:rPr lang="en-US" dirty="0" smtClean="0"/>
-              <a:t>International Timetabling Competition 2007 specifications;</a:t>
-            </a:r>
-          </a:p>
-          <a:p>
-            <a:pPr>
+              <a:t>International Timetabling Competition 2007 specifications</a:t>
+            </a:r>
+            <a:r>
+              <a:rPr lang="en-US" dirty="0" smtClean="0"/>
+              <a:t>;</a:t>
+            </a:r>
+            <a:endParaRPr lang="en-US" dirty="0" smtClean="0"/>
+          </a:p>
+          <a:p>
+            <a:pPr lvl="1">
               <a:buFont typeface="Arial" panose="020B0604020202020204" pitchFamily="34" charset="0"/>
               <a:buChar char="•"/>
             </a:pPr>
@@ -6561,7 +7749,7 @@
             </a:r>
           </a:p>
           <a:p>
-            <a:pPr>
+            <a:pPr lvl="1">
               <a:buFont typeface="Arial" panose="020B0604020202020204" pitchFamily="34" charset="0"/>
               <a:buChar char="•"/>
             </a:pPr>
@@ -6668,7 +7856,7 @@
             </a:r>
           </a:p>
           <a:p>
-            <a:pPr>
+            <a:pPr lvl="1">
               <a:buFont typeface="Arial" panose="020B0604020202020204" pitchFamily="34" charset="0"/>
               <a:buChar char="•"/>
             </a:pPr>
@@ -6678,7 +7866,7 @@
             </a:r>
           </a:p>
           <a:p>
-            <a:pPr>
+            <a:pPr lvl="1">
               <a:buFont typeface="Arial" panose="020B0604020202020204" pitchFamily="34" charset="0"/>
               <a:buChar char="•"/>
             </a:pPr>
@@ -6711,7 +7899,7 @@
             </a:r>
           </a:p>
           <a:p>
-            <a:pPr>
+            <a:pPr lvl="1">
               <a:buFont typeface="Arial" panose="020B0604020202020204" pitchFamily="34" charset="0"/>
               <a:buChar char="•"/>
             </a:pPr>
@@ -6721,7 +7909,7 @@
             </a:r>
           </a:p>
           <a:p>
-            <a:pPr>
+            <a:pPr lvl="1">
               <a:buFont typeface="Arial" panose="020B0604020202020204" pitchFamily="34" charset="0"/>
               <a:buChar char="•"/>
             </a:pPr>
@@ -6731,7 +7919,7 @@
             </a:r>
           </a:p>
           <a:p>
-            <a:pPr>
+            <a:pPr lvl="1">
               <a:buFont typeface="Arial" panose="020B0604020202020204" pitchFamily="34" charset="0"/>
               <a:buChar char="•"/>
             </a:pPr>
@@ -6741,7 +7929,7 @@
             </a:r>
           </a:p>
           <a:p>
-            <a:pPr>
+            <a:pPr lvl="1">
               <a:buFont typeface="Arial" panose="020B0604020202020204" pitchFamily="34" charset="0"/>
               <a:buChar char="•"/>
             </a:pPr>
@@ -6840,7 +8028,7 @@
             </a:r>
           </a:p>
           <a:p>
-            <a:pPr>
+            <a:pPr lvl="1">
               <a:buFont typeface="Arial" panose="020B0604020202020204" pitchFamily="34" charset="0"/>
               <a:buChar char="•"/>
             </a:pPr>
@@ -6850,7 +8038,7 @@
             </a:r>
           </a:p>
           <a:p>
-            <a:pPr>
+            <a:pPr lvl="1">
               <a:buFont typeface="Arial" panose="020B0604020202020204" pitchFamily="34" charset="0"/>
               <a:buChar char="•"/>
             </a:pPr>
@@ -6864,7 +8052,7 @@
             </a:r>
           </a:p>
           <a:p>
-            <a:pPr>
+            <a:pPr lvl="1">
               <a:buFont typeface="Arial" panose="020B0604020202020204" pitchFamily="34" charset="0"/>
               <a:buChar char="•"/>
             </a:pPr>
@@ -6878,7 +8066,7 @@
             </a:r>
           </a:p>
           <a:p>
-            <a:pPr>
+            <a:pPr lvl="1">
               <a:buFont typeface="Arial" panose="020B0604020202020204" pitchFamily="34" charset="0"/>
               <a:buChar char="•"/>
             </a:pPr>
@@ -6896,7 +8084,7 @@
             </a:r>
           </a:p>
           <a:p>
-            <a:pPr>
+            <a:pPr lvl="1">
               <a:buFont typeface="Arial" panose="020B0604020202020204" pitchFamily="34" charset="0"/>
               <a:buChar char="•"/>
             </a:pPr>
@@ -6914,7 +8102,7 @@
             </a:r>
           </a:p>
           <a:p>
-            <a:pPr>
+            <a:pPr lvl="1">
               <a:buFont typeface="Arial" panose="020B0604020202020204" pitchFamily="34" charset="0"/>
               <a:buChar char="•"/>
             </a:pPr>
@@ -6932,7 +8120,7 @@
             </a:r>
           </a:p>
           <a:p>
-            <a:pPr>
+            <a:pPr lvl="1">
               <a:buFont typeface="Arial" panose="020B0604020202020204" pitchFamily="34" charset="0"/>
               <a:buChar char="•"/>
             </a:pPr>

</xml_diff>